<commit_message>
Cập nhật tên bài tập
</commit_message>
<xml_diff>
--- a/Bai 11 Nén chi muc nguoc.pptx
+++ b/Bai 11 Nén chi muc nguoc.pptx
@@ -170,7 +170,7 @@
   </p:defaultTextStyle>
   <p:extLst>
     <p:ext uri="{EFAFB233-063F-42B5-8137-9DF3F51BA10A}">
-      <p15:sldGuideLst xmlns="" xmlns:p15="http://schemas.microsoft.com/office/powerpoint/2012/main">
+      <p15:sldGuideLst xmlns:p15="http://schemas.microsoft.com/office/powerpoint/2012/main" xmlns="">
         <p15:guide id="1" orient="horz" pos="2160">
           <p15:clr>
             <a:srgbClr val="A4A3A4"/>
@@ -6601,12 +6601,12 @@
           <a:graphicData uri="http://schemas.openxmlformats.org/presentationml/2006/ole">
             <mc:AlternateContent xmlns:mc="http://schemas.openxmlformats.org/markup-compatibility/2006">
               <mc:Choice xmlns:v="urn:schemas-microsoft-com:vml" Requires="v">
-                <p:oleObj spid="_x0000_s562477" name="Document" r:id="rId3" imgW="6562100" imgH="4119372" progId="Word.Document.8">
+                <p:oleObj spid="_x0000_s562478" name="Document" r:id="rId4" imgW="6562100" imgH="4119372" progId="Word.Document.8">
                   <p:embed/>
                 </p:oleObj>
               </mc:Choice>
               <mc:Fallback>
-                <p:oleObj name="Document" r:id="rId3" imgW="6562100" imgH="4119372" progId="Word.Document.8">
+                <p:oleObj name="Document" r:id="rId4" imgW="6562100" imgH="4119372" progId="Word.Document.8">
                   <p:embed/>
                   <p:pic>
                     <p:nvPicPr>
@@ -6617,7 +6617,7 @@
                       <p:nvPr/>
                     </p:nvPicPr>
                     <p:blipFill>
-                      <a:blip r:embed="rId4"/>
+                      <a:blip r:embed="rId5"/>
                       <a:srcRect/>
                       <a:stretch>
                         <a:fillRect/>
@@ -8376,7 +8376,7 @@
           <a:graphicData uri="http://schemas.openxmlformats.org/presentationml/2006/ole">
             <mc:AlternateContent xmlns:mc="http://schemas.openxmlformats.org/markup-compatibility/2006">
               <mc:Choice xmlns:v="urn:schemas-microsoft-com:vml" Requires="v">
-                <p:oleObj spid="_x0000_s564523" name="Документ" r:id="rId3" imgW="6404760" imgH="3941280" progId="Word.Document.8">
+                <p:oleObj spid="_x0000_s564524" name="Документ" r:id="rId3" imgW="6404760" imgH="3941280" progId="Word.Document.8">
                   <p:embed/>
                 </p:oleObj>
               </mc:Choice>
@@ -9779,7 +9779,7 @@
           <a:graphicData uri="http://schemas.openxmlformats.org/presentationml/2006/ole">
             <mc:AlternateContent xmlns:mc="http://schemas.openxmlformats.org/markup-compatibility/2006">
               <mc:Choice xmlns:v="urn:schemas-microsoft-com:vml" Requires="v">
-                <p:oleObj spid="_x0000_s566564" name="Document" r:id="rId3" imgW="6599520" imgH="4689000" progId="Word.Document.8">
+                <p:oleObj spid="_x0000_s566565" name="Document" r:id="rId3" imgW="6599520" imgH="4689000" progId="Word.Document.8">
                   <p:embed/>
                 </p:oleObj>
               </mc:Choice>
@@ -27365,11 +27365,7 @@
           <a:p>
             <a:r>
               <a:rPr lang="vi-VN" smtClean="0"/>
-              <a:t>Bài </a:t>
-            </a:r>
-            <a:r>
-              <a:rPr lang="vi-VN" smtClean="0"/>
-              <a:t>1</a:t>
+              <a:t>Bài tập 11.1</a:t>
             </a:r>
             <a:endParaRPr lang="vi-VN" dirty="0"/>
           </a:p>
@@ -27422,11 +27418,7 @@
             </a:r>
             <a:r>
               <a:rPr lang="vi-VN" smtClean="0"/>
-              <a:t>) </a:t>
-            </a:r>
-            <a:r>
-              <a:rPr lang="vi-VN" smtClean="0"/>
-              <a:t>Hãy </a:t>
+              <a:t>) Hãy </a:t>
             </a:r>
             <a:r>
               <a:rPr lang="vi-VN" dirty="0" smtClean="0"/>
@@ -27443,11 +27435,7 @@
             </a:r>
             <a:r>
               <a:rPr lang="vi-VN" smtClean="0"/>
-              <a:t>) </a:t>
-            </a:r>
-            <a:r>
-              <a:rPr lang="vi-VN" smtClean="0"/>
-              <a:t>Hãy </a:t>
+              <a:t>) Hãy </a:t>
             </a:r>
             <a:r>
               <a:rPr lang="vi-VN" dirty="0" smtClean="0"/>
@@ -27464,11 +27452,7 @@
             </a:r>
             <a:r>
               <a:rPr lang="vi-VN" smtClean="0"/>
-              <a:t>) </a:t>
-            </a:r>
-            <a:r>
-              <a:rPr lang="vi-VN" smtClean="0"/>
-              <a:t>Hãy </a:t>
+              <a:t>) Hãy </a:t>
             </a:r>
             <a:r>
               <a:rPr lang="vi-VN" dirty="0" smtClean="0"/>
@@ -27559,7 +27543,7 @@
             </a:r>
             <a:r>
               <a:rPr lang="vi-VN" smtClean="0"/>
-              <a:t>2</a:t>
+              <a:t>tập 11.2</a:t>
             </a:r>
             <a:endParaRPr lang="vi-VN" dirty="0"/>
           </a:p>
@@ -27921,7 +27905,7 @@
             </a:r>
             <a:r>
               <a:rPr lang="en-US" smtClean="0"/>
-              <a:t>3</a:t>
+              <a:t>tập 11.3</a:t>
             </a:r>
             <a:r>
               <a:rPr lang="vi-VN" smtClean="0"/>
@@ -28044,7 +28028,7 @@
             </a:r>
             <a:r>
               <a:rPr lang="vi-VN" smtClean="0"/>
-              <a:t>4 </a:t>
+              <a:t>tập 11.4 </a:t>
             </a:r>
             <a:endParaRPr lang="vi-VN" dirty="0"/>
           </a:p>
@@ -28745,7 +28729,7 @@
           <a:graphicData uri="http://schemas.openxmlformats.org/presentationml/2006/ole">
             <mc:AlternateContent xmlns:mc="http://schemas.openxmlformats.org/markup-compatibility/2006">
               <mc:Choice xmlns:v="urn:schemas-microsoft-com:vml" Requires="v">
-                <p:oleObj spid="_x0000_s606972" name="Equation" r:id="rId3" imgW="799920" imgH="253800" progId="Equation.3">
+                <p:oleObj spid="_x0000_s606975" name="Equation" r:id="rId3" imgW="799920" imgH="253800" progId="Equation.3">
                   <p:embed/>
                 </p:oleObj>
               </mc:Choice>
@@ -28838,7 +28822,7 @@
           <a:graphicData uri="http://schemas.openxmlformats.org/presentationml/2006/ole">
             <mc:AlternateContent xmlns:mc="http://schemas.openxmlformats.org/markup-compatibility/2006">
               <mc:Choice xmlns:v="urn:schemas-microsoft-com:vml" Requires="v">
-                <p:oleObj spid="_x0000_s606973" name="Equation" r:id="rId5" imgW="939600" imgH="419040" progId="Equation.3">
+                <p:oleObj spid="_x0000_s606976" name="Equation" r:id="rId5" imgW="939600" imgH="419040" progId="Equation.3">
                   <p:embed/>
                 </p:oleObj>
               </mc:Choice>
@@ -28931,7 +28915,7 @@
           <a:graphicData uri="http://schemas.openxmlformats.org/presentationml/2006/ole">
             <mc:AlternateContent xmlns:mc="http://schemas.openxmlformats.org/markup-compatibility/2006">
               <mc:Choice xmlns:v="urn:schemas-microsoft-com:vml" Requires="v">
-                <p:oleObj spid="_x0000_s606974" name="Equation" r:id="rId7" imgW="1574640" imgH="533160" progId="Equation.3">
+                <p:oleObj spid="_x0000_s606977" name="Equation" r:id="rId7" imgW="1574640" imgH="533160" progId="Equation.3">
                   <p:embed/>
                 </p:oleObj>
               </mc:Choice>
@@ -30698,7 +30682,7 @@
   </a:extraClrSchemeLst>
   <a:extLst>
     <a:ext uri="{05A4C25C-085E-4340-85A3-A5531E510DB2}">
-      <thm15:themeFamily xmlns="" xmlns:thm15="http://schemas.microsoft.com/office/thememl/2012/main" name="Office Theme" id="{62F939B6-93AF-4DB8-9C6B-D6C7DFDC589F}" vid="{4A3C46E8-61CC-4603-A589-7422A47A8E4A}"/>
+      <thm15:themeFamily xmlns:thm15="http://schemas.microsoft.com/office/thememl/2012/main" xmlns="" name="Office Theme" id="{62F939B6-93AF-4DB8-9C6B-D6C7DFDC589F}" vid="{4A3C46E8-61CC-4603-A589-7422A47A8E4A}"/>
     </a:ext>
   </a:extLst>
 </a:theme>
@@ -30959,7 +30943,7 @@
   <a:extraClrSchemeLst/>
   <a:extLst>
     <a:ext uri="{05A4C25C-085E-4340-85A3-A5531E510DB2}">
-      <thm15:themeFamily xmlns="" xmlns:thm15="http://schemas.microsoft.com/office/thememl/2012/main" name="Office Theme" id="{62F939B6-93AF-4DB8-9C6B-D6C7DFDC589F}" vid="{4A3C46E8-61CC-4603-A589-7422A47A8E4A}"/>
+      <thm15:themeFamily xmlns:thm15="http://schemas.microsoft.com/office/thememl/2012/main" xmlns="" name="Office Theme" id="{62F939B6-93AF-4DB8-9C6B-D6C7DFDC589F}" vid="{4A3C46E8-61CC-4603-A589-7422A47A8E4A}"/>
     </a:ext>
   </a:extLst>
 </a:theme>

</xml_diff>

<commit_message>
bx giải thuật mã hóa và giải mã VB
</commit_message>
<xml_diff>
--- a/Bai 11 Nén chi muc nguoc.pptx
+++ b/Bai 11 Nén chi muc nguoc.pptx
@@ -5,7 +5,7 @@
     <p:sldMasterId id="2147483652" r:id="rId1"/>
   </p:sldMasterIdLst>
   <p:notesMasterIdLst>
-    <p:notesMasterId r:id="rId34"/>
+    <p:notesMasterId r:id="rId35"/>
   </p:notesMasterIdLst>
   <p:sldIdLst>
     <p:sldId id="363" r:id="rId2"/>
@@ -29,17 +29,18 @@
     <p:sldId id="610" r:id="rId20"/>
     <p:sldId id="586" r:id="rId21"/>
     <p:sldId id="589" r:id="rId22"/>
-    <p:sldId id="590" r:id="rId23"/>
-    <p:sldId id="591" r:id="rId24"/>
-    <p:sldId id="592" r:id="rId25"/>
-    <p:sldId id="593" r:id="rId26"/>
-    <p:sldId id="594" r:id="rId27"/>
-    <p:sldId id="595" r:id="rId28"/>
-    <p:sldId id="611" r:id="rId29"/>
-    <p:sldId id="612" r:id="rId30"/>
-    <p:sldId id="613" r:id="rId31"/>
-    <p:sldId id="614" r:id="rId32"/>
-    <p:sldId id="554" r:id="rId33"/>
+    <p:sldId id="615" r:id="rId23"/>
+    <p:sldId id="590" r:id="rId24"/>
+    <p:sldId id="591" r:id="rId25"/>
+    <p:sldId id="592" r:id="rId26"/>
+    <p:sldId id="593" r:id="rId27"/>
+    <p:sldId id="594" r:id="rId28"/>
+    <p:sldId id="595" r:id="rId29"/>
+    <p:sldId id="611" r:id="rId30"/>
+    <p:sldId id="612" r:id="rId31"/>
+    <p:sldId id="613" r:id="rId32"/>
+    <p:sldId id="614" r:id="rId33"/>
+    <p:sldId id="554" r:id="rId34"/>
   </p:sldIdLst>
   <p:sldSz cx="9144000" cy="6858000" type="screen4x3"/>
   <p:notesSz cx="6858000" cy="9144000"/>
@@ -170,7 +171,7 @@
   </p:defaultTextStyle>
   <p:extLst>
     <p:ext uri="{EFAFB233-063F-42B5-8137-9DF3F51BA10A}">
-      <p15:sldGuideLst xmlns:p15="http://schemas.microsoft.com/office/powerpoint/2012/main" xmlns="">
+      <p15:sldGuideLst xmlns="" xmlns:p15="http://schemas.microsoft.com/office/powerpoint/2012/main">
         <p15:guide id="1" orient="horz" pos="2160">
           <p15:clr>
             <a:srgbClr val="A4A3A4"/>
@@ -1715,87 +1716,332 @@
           <a:bodyPr/>
           <a:lstStyle/>
           <a:p>
+            <a:pPr marL="342900" lvl="1" indent="-342900">
+              <a:lnSpc>
+                <a:spcPct val="150000"/>
+              </a:lnSpc>
+              <a:spcBef>
+                <a:spcPts val="0"/>
+              </a:spcBef>
+              <a:buClr>
+                <a:schemeClr val="folHlink"/>
+              </a:buClr>
+              <a:buSzPct val="60000"/>
+            </a:pPr>
             <a:r>
               <a:rPr lang="en-US" dirty="0" err="1" smtClean="0"/>
               <a:t>Được</a:t>
             </a:r>
             <a:r>
-              <a:rPr lang="en-US" baseline="0" dirty="0" smtClean="0"/>
+              <a:rPr lang="en-US" dirty="0" smtClean="0"/>
               <a:t> </a:t>
             </a:r>
             <a:r>
-              <a:rPr lang="en-US" baseline="0" dirty="0" err="1" smtClean="0"/>
+              <a:rPr lang="en-US" dirty="0" err="1" smtClean="0"/>
               <a:t>sử</a:t>
             </a:r>
             <a:r>
-              <a:rPr lang="en-US" baseline="0" dirty="0" smtClean="0"/>
+              <a:rPr lang="en-US" dirty="0" smtClean="0"/>
               <a:t> </a:t>
             </a:r>
             <a:r>
-              <a:rPr lang="en-US" baseline="0" dirty="0" err="1" smtClean="0"/>
+              <a:rPr lang="en-US" dirty="0" err="1" smtClean="0"/>
               <a:t>dụng</a:t>
             </a:r>
             <a:r>
-              <a:rPr lang="en-US" baseline="0" dirty="0" smtClean="0"/>
+              <a:rPr lang="en-US" dirty="0" smtClean="0"/>
               <a:t> </a:t>
             </a:r>
             <a:r>
-              <a:rPr lang="en-US" baseline="0" dirty="0" err="1" smtClean="0"/>
-              <a:t>để</a:t>
-            </a:r>
-            <a:r>
-              <a:rPr lang="en-US" baseline="0" dirty="0" smtClean="0"/>
+              <a:rPr lang="en-US" dirty="0" err="1" smtClean="0"/>
+              <a:t>trong</a:t>
+            </a:r>
+            <a:r>
+              <a:rPr lang="en-US" dirty="0" smtClean="0"/>
               <a:t> </a:t>
             </a:r>
             <a:r>
-              <a:rPr lang="en-US" baseline="0" dirty="0" err="1" smtClean="0"/>
-              <a:t>xây</a:t>
-            </a:r>
-            <a:r>
-              <a:rPr lang="en-US" baseline="0" dirty="0" smtClean="0"/>
+              <a:rPr lang="en-US" dirty="0" err="1" smtClean="0"/>
+              <a:t>nhiều</a:t>
+            </a:r>
+            <a:r>
+              <a:rPr lang="en-US" dirty="0" smtClean="0"/>
               <a:t> </a:t>
             </a:r>
             <a:r>
-              <a:rPr lang="en-US" baseline="0" dirty="0" err="1" smtClean="0"/>
-              <a:t>dựng</a:t>
-            </a:r>
-            <a:r>
-              <a:rPr lang="en-US" baseline="0" dirty="0" smtClean="0"/>
+              <a:rPr lang="en-US" dirty="0" err="1" smtClean="0"/>
+              <a:t>hệ</a:t>
+            </a:r>
+            <a:r>
+              <a:rPr lang="en-US" dirty="0" smtClean="0"/>
               <a:t> </a:t>
             </a:r>
             <a:r>
-              <a:rPr lang="en-US" baseline="0" dirty="0" err="1" smtClean="0"/>
+              <a:rPr lang="en-US" dirty="0" err="1" smtClean="0"/>
+              <a:t>thống</a:t>
+            </a:r>
+            <a:r>
+              <a:rPr lang="en-US" dirty="0" smtClean="0"/>
+              <a:t> </a:t>
+            </a:r>
+            <a:r>
+              <a:rPr lang="en-US" dirty="0" err="1" smtClean="0"/>
+              <a:t>thương</a:t>
+            </a:r>
+            <a:r>
+              <a:rPr lang="en-US" dirty="0" smtClean="0"/>
+              <a:t> </a:t>
+            </a:r>
+            <a:r>
+              <a:rPr lang="en-US" dirty="0" err="1" smtClean="0"/>
+              <a:t>mại</a:t>
+            </a:r>
+            <a:r>
+              <a:rPr lang="en-US" dirty="0" smtClean="0"/>
+              <a:t>/</a:t>
+            </a:r>
+            <a:r>
+              <a:rPr lang="en-US" dirty="0" err="1" smtClean="0"/>
+              <a:t>nghiên</a:t>
+            </a:r>
+            <a:r>
+              <a:rPr lang="en-US" dirty="0" smtClean="0"/>
+              <a:t> </a:t>
+            </a:r>
+            <a:r>
+              <a:rPr lang="en-US" dirty="0" err="1" smtClean="0"/>
+              <a:t>cứu</a:t>
+            </a:r>
+            <a:endParaRPr lang="en-US" sz="2800" dirty="0" smtClean="0"/>
+          </a:p>
+          <a:p>
+            <a:pPr>
+              <a:lnSpc>
+                <a:spcPct val="150000"/>
+              </a:lnSpc>
+              <a:spcBef>
+                <a:spcPts val="0"/>
+              </a:spcBef>
+            </a:pPr>
+            <a:r>
+              <a:rPr lang="en-US" sz="2400" dirty="0" err="1" smtClean="0"/>
+              <a:t>Có</a:t>
+            </a:r>
+            <a:r>
+              <a:rPr lang="en-US" sz="2400" dirty="0" smtClean="0"/>
+              <a:t> log</a:t>
+            </a:r>
+            <a:r>
+              <a:rPr lang="en-US" sz="2400" baseline="-25000" dirty="0" smtClean="0"/>
+              <a:t>2</a:t>
+            </a:r>
+            <a:r>
+              <a:rPr lang="en-US" sz="2400" i="1" dirty="0" smtClean="0"/>
+              <a:t>G</a:t>
+            </a:r>
+            <a:r>
+              <a:rPr lang="en-US" sz="2400" dirty="0" smtClean="0"/>
+              <a:t>  bits </a:t>
+            </a:r>
+            <a:r>
+              <a:rPr lang="en-US" sz="2400" dirty="0" err="1" smtClean="0"/>
+              <a:t>trong</a:t>
+            </a:r>
+            <a:r>
+              <a:rPr lang="en-US" sz="2400" dirty="0" smtClean="0"/>
+              <a:t> </a:t>
+            </a:r>
+            <a:r>
+              <a:rPr lang="en-US" sz="2400" dirty="0" err="1" smtClean="0"/>
+              <a:t>biểu</a:t>
+            </a:r>
+            <a:r>
+              <a:rPr lang="en-US" sz="2400" dirty="0" smtClean="0"/>
+              <a:t> </a:t>
+            </a:r>
+            <a:r>
+              <a:rPr lang="en-US" sz="2400" dirty="0" err="1" smtClean="0"/>
+              <a:t>diễn</a:t>
+            </a:r>
+            <a:r>
+              <a:rPr lang="en-US" sz="2400" dirty="0" smtClean="0"/>
+              <a:t> </a:t>
+            </a:r>
+            <a:r>
+              <a:rPr lang="en-US" sz="2400" dirty="0" err="1" smtClean="0"/>
+              <a:t>nhị</a:t>
+            </a:r>
+            <a:r>
+              <a:rPr lang="en-US" sz="2400" dirty="0" smtClean="0"/>
+              <a:t> </a:t>
+            </a:r>
+            <a:r>
+              <a:rPr lang="en-US" sz="2400" dirty="0" err="1" smtClean="0"/>
+              <a:t>phân</a:t>
+            </a:r>
+            <a:r>
+              <a:rPr lang="en-US" sz="2400" dirty="0" smtClean="0"/>
+              <a:t> </a:t>
+            </a:r>
+            <a:r>
+              <a:rPr lang="en-US" sz="2400" dirty="0" err="1" smtClean="0"/>
+              <a:t>của</a:t>
+            </a:r>
+            <a:r>
+              <a:rPr lang="en-US" sz="2400" dirty="0" smtClean="0"/>
+              <a:t> </a:t>
+            </a:r>
+            <a:r>
+              <a:rPr lang="en-US" sz="2400" dirty="0" err="1" smtClean="0"/>
+              <a:t>khoảng</a:t>
+            </a:r>
+            <a:r>
+              <a:rPr lang="en-US" sz="2400" dirty="0" smtClean="0"/>
+              <a:t> </a:t>
+            </a:r>
+            <a:r>
+              <a:rPr lang="en-US" sz="2400" dirty="0" err="1" smtClean="0"/>
+              <a:t>cách</a:t>
+            </a:r>
+            <a:r>
+              <a:rPr lang="en-US" sz="2400" dirty="0" smtClean="0"/>
+              <a:t> </a:t>
+            </a:r>
+            <a:r>
+              <a:rPr lang="en-US" sz="2400" i="1" dirty="0" smtClean="0"/>
+              <a:t>G</a:t>
+            </a:r>
+            <a:r>
+              <a:rPr lang="en-US" sz="2400" dirty="0" smtClean="0"/>
+              <a:t>.</a:t>
+            </a:r>
+          </a:p>
+          <a:p>
+            <a:pPr>
+              <a:lnSpc>
+                <a:spcPct val="150000"/>
+              </a:lnSpc>
+              <a:spcBef>
+                <a:spcPts val="0"/>
+              </a:spcBef>
+            </a:pPr>
+            <a:r>
+              <a:rPr lang="en-US" sz="2400" dirty="0" smtClean="0"/>
+              <a:t>Bit c </a:t>
+            </a:r>
+            <a:r>
+              <a:rPr lang="en-US" sz="2400" dirty="0" err="1" smtClean="0"/>
+              <a:t>được</a:t>
+            </a:r>
+            <a:r>
+              <a:rPr lang="en-US" sz="2400" baseline="0" dirty="0" smtClean="0"/>
+              <a:t> </a:t>
+            </a:r>
+            <a:r>
+              <a:rPr lang="en-US" sz="2400" baseline="0" dirty="0" err="1" smtClean="0"/>
+              <a:t>sử</a:t>
+            </a:r>
+            <a:r>
+              <a:rPr lang="en-US" sz="2400" baseline="0" dirty="0" smtClean="0"/>
+              <a:t> </a:t>
+            </a:r>
+            <a:r>
+              <a:rPr lang="en-US" sz="2400" baseline="0" dirty="0" err="1" smtClean="0"/>
+              <a:t>dụng</a:t>
+            </a:r>
+            <a:r>
+              <a:rPr lang="en-US" sz="2400" baseline="0" dirty="0" smtClean="0"/>
+              <a:t> </a:t>
+            </a:r>
+            <a:r>
+              <a:rPr lang="en-US" sz="2400" baseline="0" dirty="0" err="1" smtClean="0"/>
+              <a:t>làm</a:t>
+            </a:r>
+            <a:r>
+              <a:rPr lang="en-US" sz="2400" baseline="0" dirty="0" smtClean="0"/>
+              <a:t> </a:t>
+            </a:r>
+            <a:r>
+              <a:rPr lang="en-US" sz="2400" baseline="0" dirty="0" err="1" smtClean="0"/>
+              <a:t>dấu</a:t>
+            </a:r>
+            <a:r>
+              <a:rPr lang="en-US" sz="2400" baseline="0" dirty="0" smtClean="0"/>
+              <a:t> </a:t>
+            </a:r>
+            <a:r>
+              <a:rPr lang="en-US" sz="2400" baseline="0" dirty="0" err="1" smtClean="0"/>
+              <a:t>hiệu</a:t>
+            </a:r>
+            <a:r>
+              <a:rPr lang="en-US" sz="2400" baseline="0" dirty="0" smtClean="0"/>
+              <a:t> </a:t>
+            </a:r>
+            <a:r>
+              <a:rPr lang="en-US" sz="2400" baseline="0" dirty="0" err="1" smtClean="0"/>
+              <a:t>xác</a:t>
+            </a:r>
+            <a:r>
+              <a:rPr lang="en-US" sz="2400" baseline="0" dirty="0" smtClean="0"/>
+              <a:t> </a:t>
+            </a:r>
+            <a:r>
+              <a:rPr lang="en-US" sz="2400" baseline="0" dirty="0" err="1" smtClean="0"/>
+              <a:t>định</a:t>
+            </a:r>
+            <a:r>
+              <a:rPr lang="en-US" sz="2400" baseline="0" dirty="0" smtClean="0"/>
+              <a:t> bytes </a:t>
+            </a:r>
+            <a:r>
+              <a:rPr lang="en-US" sz="2400" baseline="0" dirty="0" err="1" smtClean="0"/>
+              <a:t>kết</a:t>
+            </a:r>
+            <a:r>
+              <a:rPr lang="en-US" sz="2400" baseline="0" dirty="0" smtClean="0"/>
+              <a:t> </a:t>
+            </a:r>
+            <a:r>
+              <a:rPr lang="en-US" sz="2400" baseline="0" dirty="0" err="1" smtClean="0"/>
+              <a:t>thúc</a:t>
+            </a:r>
+            <a:r>
+              <a:rPr lang="en-US" sz="2400" baseline="0" dirty="0" smtClean="0"/>
+              <a:t> </a:t>
+            </a:r>
+            <a:r>
+              <a:rPr lang="en-US" sz="2400" baseline="0" dirty="0" err="1" smtClean="0"/>
+              <a:t>của</a:t>
+            </a:r>
+            <a:r>
+              <a:rPr lang="en-US" sz="2400" baseline="0" dirty="0" smtClean="0"/>
+              <a:t> </a:t>
+            </a:r>
+            <a:r>
+              <a:rPr lang="en-US" sz="2400" baseline="0" dirty="0" err="1" smtClean="0"/>
               <a:t>mã</a:t>
             </a:r>
             <a:r>
-              <a:rPr lang="en-US" baseline="0" dirty="0" smtClean="0"/>
-              <a:t> Gamma (</a:t>
-            </a:r>
-            <a:r>
-              <a:rPr lang="en-US" baseline="0" dirty="0" err="1" smtClean="0"/>
-              <a:t>biểu</a:t>
-            </a:r>
-            <a:r>
-              <a:rPr lang="en-US" baseline="0" dirty="0" smtClean="0"/>
+              <a:rPr lang="en-US" sz="2400" baseline="0" dirty="0" smtClean="0"/>
               <a:t> </a:t>
             </a:r>
             <a:r>
-              <a:rPr lang="en-US" baseline="0" dirty="0" err="1" smtClean="0"/>
-              <a:t>diễn</a:t>
-            </a:r>
-            <a:r>
-              <a:rPr lang="en-US" baseline="0" dirty="0" smtClean="0"/>
-              <a:t> length </a:t>
-            </a:r>
-            <a:r>
-              <a:rPr lang="en-US" baseline="0" dirty="0" err="1" smtClean="0"/>
-              <a:t>của</a:t>
-            </a:r>
-            <a:r>
-              <a:rPr lang="en-US" baseline="0" dirty="0" smtClean="0"/>
-              <a:t> offset)</a:t>
-            </a:r>
-            <a:endParaRPr lang="vi-VN" dirty="0"/>
+              <a:rPr lang="en-US" sz="2400" baseline="0" dirty="0" err="1" smtClean="0"/>
+              <a:t>văn</a:t>
+            </a:r>
+            <a:r>
+              <a:rPr lang="en-US" sz="2400" baseline="0" dirty="0" smtClean="0"/>
+              <a:t> </a:t>
+            </a:r>
+            <a:r>
+              <a:rPr lang="en-US" sz="2400" baseline="0" dirty="0" err="1" smtClean="0"/>
+              <a:t>bản</a:t>
+            </a:r>
+            <a:r>
+              <a:rPr lang="en-US" sz="2400" baseline="0" dirty="0" smtClean="0"/>
+              <a:t>.</a:t>
+            </a:r>
+            <a:endParaRPr lang="en-US" sz="2400" dirty="0" smtClean="0"/>
           </a:p>
         </p:txBody>
       </p:sp>
@@ -1817,7 +2063,7 @@
             <a:fld id="{A822785D-F645-413D-923F-0CBFE5486660}" type="slidenum">
               <a:rPr lang="vi-VN" smtClean="0"/>
               <a:pPr/>
-              <a:t>24</a:t>
+              <a:t>22</a:t>
             </a:fld>
             <a:endParaRPr lang="vi-VN"/>
           </a:p>
@@ -1826,7 +2072,7 @@
     </p:spTree>
     <p:extLst>
       <p:ext uri="{BB962C8B-B14F-4D97-AF65-F5344CB8AC3E}">
-        <p14:creationId xmlns:p14="http://schemas.microsoft.com/office/powerpoint/2010/main" val="2800486642"/>
+        <p14:creationId xmlns:p14="http://schemas.microsoft.com/office/powerpoint/2010/main" val="1804780267"/>
       </p:ext>
     </p:extLst>
   </p:cSld>
@@ -1882,15 +2128,7 @@
           <a:p>
             <a:r>
               <a:rPr lang="en-US" dirty="0" err="1" smtClean="0"/>
-              <a:t>Phép</a:t>
-            </a:r>
-            <a:r>
-              <a:rPr lang="en-US" baseline="0" dirty="0" smtClean="0"/>
-              <a:t> + </a:t>
-            </a:r>
-            <a:r>
-              <a:rPr lang="en-US" baseline="0" dirty="0" err="1" smtClean="0"/>
-              <a:t>trong</a:t>
+              <a:t>Được</a:t>
             </a:r>
             <a:r>
               <a:rPr lang="en-US" baseline="0" dirty="0" smtClean="0"/>
@@ -1898,7 +2136,7 @@
             </a:r>
             <a:r>
               <a:rPr lang="en-US" baseline="0" dirty="0" err="1" smtClean="0"/>
-              <a:t>trường</a:t>
+              <a:t>sử</a:t>
             </a:r>
             <a:r>
               <a:rPr lang="en-US" baseline="0" dirty="0" smtClean="0"/>
@@ -1906,7 +2144,7 @@
             </a:r>
             <a:r>
               <a:rPr lang="en-US" baseline="0" dirty="0" err="1" smtClean="0"/>
-              <a:t>hợp</a:t>
+              <a:t>dụng</a:t>
             </a:r>
             <a:r>
               <a:rPr lang="en-US" baseline="0" dirty="0" smtClean="0"/>
@@ -1914,7 +2152,7 @@
             </a:r>
             <a:r>
               <a:rPr lang="en-US" baseline="0" dirty="0" err="1" smtClean="0"/>
-              <a:t>này</a:t>
+              <a:t>để</a:t>
             </a:r>
             <a:r>
               <a:rPr lang="en-US" baseline="0" dirty="0" smtClean="0"/>
@@ -1922,7 +2160,7 @@
             </a:r>
             <a:r>
               <a:rPr lang="en-US" baseline="0" dirty="0" err="1" smtClean="0"/>
-              <a:t>hoạt</a:t>
+              <a:t>xây</a:t>
             </a:r>
             <a:r>
               <a:rPr lang="en-US" baseline="0" dirty="0" smtClean="0"/>
@@ -1930,7 +2168,7 @@
             </a:r>
             <a:r>
               <a:rPr lang="en-US" baseline="0" dirty="0" err="1" smtClean="0"/>
-              <a:t>động</a:t>
+              <a:t>dựng</a:t>
             </a:r>
             <a:r>
               <a:rPr lang="en-US" baseline="0" dirty="0" smtClean="0"/>
@@ -1938,7 +2176,15 @@
             </a:r>
             <a:r>
               <a:rPr lang="en-US" baseline="0" dirty="0" err="1" smtClean="0"/>
-              <a:t>như</a:t>
+              <a:t>mã</a:t>
+            </a:r>
+            <a:r>
+              <a:rPr lang="en-US" baseline="0" dirty="0" smtClean="0"/>
+              <a:t> Gamma (</a:t>
+            </a:r>
+            <a:r>
+              <a:rPr lang="en-US" baseline="0" dirty="0" err="1" smtClean="0"/>
+              <a:t>biểu</a:t>
             </a:r>
             <a:r>
               <a:rPr lang="en-US" baseline="0" dirty="0" smtClean="0"/>
@@ -1946,27 +2192,19 @@
             </a:r>
             <a:r>
               <a:rPr lang="en-US" baseline="0" dirty="0" err="1" smtClean="0"/>
-              <a:t>phép</a:t>
+              <a:t>diễn</a:t>
             </a:r>
             <a:r>
               <a:rPr lang="en-US" baseline="0" dirty="0" smtClean="0"/>
-              <a:t> </a:t>
+              <a:t> length </a:t>
             </a:r>
             <a:r>
               <a:rPr lang="en-US" baseline="0" dirty="0" err="1" smtClean="0"/>
-              <a:t>nối</a:t>
+              <a:t>của</a:t>
             </a:r>
             <a:r>
               <a:rPr lang="en-US" baseline="0" dirty="0" smtClean="0"/>
-              <a:t> </a:t>
-            </a:r>
-            <a:r>
-              <a:rPr lang="en-US" baseline="0" dirty="0" err="1" smtClean="0"/>
-              <a:t>chuỗi</a:t>
-            </a:r>
-            <a:r>
-              <a:rPr lang="en-US" baseline="0" dirty="0" smtClean="0"/>
-              <a:t>.</a:t>
+              <a:t> offset)</a:t>
             </a:r>
             <a:endParaRPr lang="vi-VN" dirty="0"/>
           </a:p>
@@ -1991,6 +2229,179 @@
               <a:rPr lang="vi-VN" smtClean="0"/>
               <a:pPr/>
               <a:t>25</a:t>
+            </a:fld>
+            <a:endParaRPr lang="vi-VN"/>
+          </a:p>
+        </p:txBody>
+      </p:sp>
+    </p:spTree>
+    <p:extLst>
+      <p:ext uri="{BB962C8B-B14F-4D97-AF65-F5344CB8AC3E}">
+        <p14:creationId xmlns:p14="http://schemas.microsoft.com/office/powerpoint/2010/main" val="2800486642"/>
+      </p:ext>
+    </p:extLst>
+  </p:cSld>
+  <p:clrMapOvr>
+    <a:masterClrMapping/>
+  </p:clrMapOvr>
+</p:notes>
+</file>
+
+<file path=ppt/notesSlides/notesSlide6.xml><?xml version="1.0" encoding="utf-8"?>
+<p:notes xmlns:a="http://schemas.openxmlformats.org/drawingml/2006/main" xmlns:r="http://schemas.openxmlformats.org/officeDocument/2006/relationships" xmlns:p="http://schemas.openxmlformats.org/presentationml/2006/main">
+  <p:cSld>
+    <p:spTree>
+      <p:nvGrpSpPr>
+        <p:cNvPr id="1" name=""/>
+        <p:cNvGrpSpPr/>
+        <p:nvPr/>
+      </p:nvGrpSpPr>
+      <p:grpSpPr>
+        <a:xfrm>
+          <a:off x="0" y="0"/>
+          <a:ext cx="0" cy="0"/>
+          <a:chOff x="0" y="0"/>
+          <a:chExt cx="0" cy="0"/>
+        </a:xfrm>
+      </p:grpSpPr>
+      <p:sp>
+        <p:nvSpPr>
+          <p:cNvPr id="2" name="Slide Image Placeholder 1"/>
+          <p:cNvSpPr>
+            <a:spLocks noGrp="1" noRot="1" noChangeAspect="1"/>
+          </p:cNvSpPr>
+          <p:nvPr>
+            <p:ph type="sldImg"/>
+          </p:nvPr>
+        </p:nvSpPr>
+        <p:spPr/>
+      </p:sp>
+      <p:sp>
+        <p:nvSpPr>
+          <p:cNvPr id="3" name="Notes Placeholder 2"/>
+          <p:cNvSpPr>
+            <a:spLocks noGrp="1"/>
+          </p:cNvSpPr>
+          <p:nvPr>
+            <p:ph type="body" idx="1"/>
+          </p:nvPr>
+        </p:nvSpPr>
+        <p:spPr/>
+        <p:txBody>
+          <a:bodyPr/>
+          <a:lstStyle/>
+          <a:p>
+            <a:r>
+              <a:rPr lang="en-US" dirty="0" err="1" smtClean="0"/>
+              <a:t>Phép</a:t>
+            </a:r>
+            <a:r>
+              <a:rPr lang="en-US" baseline="0" dirty="0" smtClean="0"/>
+              <a:t> + </a:t>
+            </a:r>
+            <a:r>
+              <a:rPr lang="en-US" baseline="0" dirty="0" err="1" smtClean="0"/>
+              <a:t>trong</a:t>
+            </a:r>
+            <a:r>
+              <a:rPr lang="en-US" baseline="0" dirty="0" smtClean="0"/>
+              <a:t> </a:t>
+            </a:r>
+            <a:r>
+              <a:rPr lang="en-US" baseline="0" dirty="0" err="1" smtClean="0"/>
+              <a:t>trường</a:t>
+            </a:r>
+            <a:r>
+              <a:rPr lang="en-US" baseline="0" dirty="0" smtClean="0"/>
+              <a:t> </a:t>
+            </a:r>
+            <a:r>
+              <a:rPr lang="en-US" baseline="0" dirty="0" err="1" smtClean="0"/>
+              <a:t>hợp</a:t>
+            </a:r>
+            <a:r>
+              <a:rPr lang="en-US" baseline="0" dirty="0" smtClean="0"/>
+              <a:t> </a:t>
+            </a:r>
+            <a:r>
+              <a:rPr lang="en-US" baseline="0" dirty="0" err="1" smtClean="0"/>
+              <a:t>này</a:t>
+            </a:r>
+            <a:r>
+              <a:rPr lang="en-US" baseline="0" dirty="0" smtClean="0"/>
+              <a:t> </a:t>
+            </a:r>
+            <a:r>
+              <a:rPr lang="en-US" baseline="0" dirty="0" err="1" smtClean="0"/>
+              <a:t>hoạt</a:t>
+            </a:r>
+            <a:r>
+              <a:rPr lang="en-US" baseline="0" dirty="0" smtClean="0"/>
+              <a:t> </a:t>
+            </a:r>
+            <a:r>
+              <a:rPr lang="en-US" baseline="0" dirty="0" err="1" smtClean="0"/>
+              <a:t>động</a:t>
+            </a:r>
+            <a:r>
+              <a:rPr lang="en-US" baseline="0" dirty="0" smtClean="0"/>
+              <a:t> </a:t>
+            </a:r>
+            <a:r>
+              <a:rPr lang="en-US" baseline="0" dirty="0" err="1" smtClean="0"/>
+              <a:t>như</a:t>
+            </a:r>
+            <a:r>
+              <a:rPr lang="en-US" baseline="0" dirty="0" smtClean="0"/>
+              <a:t> </a:t>
+            </a:r>
+            <a:r>
+              <a:rPr lang="en-US" baseline="0" dirty="0" err="1" smtClean="0"/>
+              <a:t>phép</a:t>
+            </a:r>
+            <a:r>
+              <a:rPr lang="en-US" baseline="0" dirty="0" smtClean="0"/>
+              <a:t> </a:t>
+            </a:r>
+            <a:r>
+              <a:rPr lang="en-US" baseline="0" dirty="0" err="1" smtClean="0"/>
+              <a:t>nối</a:t>
+            </a:r>
+            <a:r>
+              <a:rPr lang="en-US" baseline="0" dirty="0" smtClean="0"/>
+              <a:t> </a:t>
+            </a:r>
+            <a:r>
+              <a:rPr lang="en-US" baseline="0" dirty="0" err="1" smtClean="0"/>
+              <a:t>chuỗi</a:t>
+            </a:r>
+            <a:r>
+              <a:rPr lang="en-US" baseline="0" dirty="0" smtClean="0"/>
+              <a:t>.</a:t>
+            </a:r>
+            <a:endParaRPr lang="vi-VN" dirty="0"/>
+          </a:p>
+        </p:txBody>
+      </p:sp>
+      <p:sp>
+        <p:nvSpPr>
+          <p:cNvPr id="4" name="Slide Number Placeholder 3"/>
+          <p:cNvSpPr>
+            <a:spLocks noGrp="1"/>
+          </p:cNvSpPr>
+          <p:nvPr>
+            <p:ph type="sldNum" sz="quarter" idx="10"/>
+          </p:nvPr>
+        </p:nvSpPr>
+        <p:spPr/>
+        <p:txBody>
+          <a:bodyPr/>
+          <a:lstStyle/>
+          <a:p>
+            <a:fld id="{A822785D-F645-413D-923F-0CBFE5486660}" type="slidenum">
+              <a:rPr lang="vi-VN" smtClean="0"/>
+              <a:pPr/>
+              <a:t>26</a:t>
             </a:fld>
             <a:endParaRPr lang="vi-VN"/>
           </a:p>
@@ -6601,12 +7012,12 @@
           <a:graphicData uri="http://schemas.openxmlformats.org/presentationml/2006/ole">
             <mc:AlternateContent xmlns:mc="http://schemas.openxmlformats.org/markup-compatibility/2006">
               <mc:Choice xmlns:v="urn:schemas-microsoft-com:vml" Requires="v">
-                <p:oleObj spid="_x0000_s562478" name="Document" r:id="rId4" imgW="6562100" imgH="4119372" progId="Word.Document.8">
+                <p:oleObj spid="_x0000_s562481" name="Document" r:id="rId3" imgW="6562100" imgH="4119372" progId="Word.Document.8">
                   <p:embed/>
                 </p:oleObj>
               </mc:Choice>
               <mc:Fallback>
-                <p:oleObj name="Document" r:id="rId4" imgW="6562100" imgH="4119372" progId="Word.Document.8">
+                <p:oleObj name="Document" r:id="rId3" imgW="6562100" imgH="4119372" progId="Word.Document.8">
                   <p:embed/>
                   <p:pic>
                     <p:nvPicPr>
@@ -6617,7 +7028,7 @@
                       <p:nvPr/>
                     </p:nvPicPr>
                     <p:blipFill>
-                      <a:blip r:embed="rId5"/>
+                      <a:blip r:embed="rId4"/>
                       <a:srcRect/>
                       <a:stretch>
                         <a:fillRect/>
@@ -8376,7 +8787,7 @@
           <a:graphicData uri="http://schemas.openxmlformats.org/presentationml/2006/ole">
             <mc:AlternateContent xmlns:mc="http://schemas.openxmlformats.org/markup-compatibility/2006">
               <mc:Choice xmlns:v="urn:schemas-microsoft-com:vml" Requires="v">
-                <p:oleObj spid="_x0000_s564524" name="Документ" r:id="rId3" imgW="6404760" imgH="3941280" progId="Word.Document.8">
+                <p:oleObj spid="_x0000_s564527" name="Документ" r:id="rId3" imgW="6404760" imgH="3941280" progId="Word.Document.8">
                   <p:embed/>
                 </p:oleObj>
               </mc:Choice>
@@ -9779,7 +10190,7 @@
           <a:graphicData uri="http://schemas.openxmlformats.org/presentationml/2006/ole">
             <mc:AlternateContent xmlns:mc="http://schemas.openxmlformats.org/markup-compatibility/2006">
               <mc:Choice xmlns:v="urn:schemas-microsoft-com:vml" Requires="v">
-                <p:oleObj spid="_x0000_s566565" name="Document" r:id="rId3" imgW="6599520" imgH="4689000" progId="Word.Document.8">
+                <p:oleObj spid="_x0000_s566568" name="Document" r:id="rId3" imgW="6599520" imgH="4689000" progId="Word.Document.8">
                   <p:embed/>
                 </p:oleObj>
               </mc:Choice>
@@ -13580,6 +13991,198 @@
       </p:grpSpPr>
       <p:sp>
         <p:nvSpPr>
+          <p:cNvPr id="7" name="Slide Number Placeholder 5"/>
+          <p:cNvSpPr>
+            <a:spLocks noGrp="1"/>
+          </p:cNvSpPr>
+          <p:nvPr>
+            <p:ph type="sldNum" sz="quarter" idx="12"/>
+          </p:nvPr>
+        </p:nvSpPr>
+        <p:spPr/>
+        <p:txBody>
+          <a:bodyPr/>
+          <a:lstStyle/>
+          <a:p>
+            <a:fld id="{3EE169CB-562A-43B8-8574-700297845709}" type="slidenum">
+              <a:rPr lang="vi-VN"/>
+              <a:pPr/>
+              <a:t>22</a:t>
+            </a:fld>
+            <a:endParaRPr lang="vi-VN"/>
+          </a:p>
+        </p:txBody>
+      </p:sp>
+      <p:sp>
+        <p:nvSpPr>
+          <p:cNvPr id="581634" name="Rectangle 2"/>
+          <p:cNvSpPr>
+            <a:spLocks noGrp="1" noChangeArrowheads="1"/>
+          </p:cNvSpPr>
+          <p:nvPr>
+            <p:ph type="title"/>
+          </p:nvPr>
+        </p:nvSpPr>
+        <p:spPr/>
+        <p:txBody>
+          <a:bodyPr/>
+          <a:lstStyle/>
+          <a:p>
+            <a:r>
+              <a:rPr lang="vi-VN" smtClean="0"/>
+              <a:t>Mã VB (2)</a:t>
+            </a:r>
+            <a:endParaRPr lang="vi-VN" dirty="0"/>
+          </a:p>
+        </p:txBody>
+      </p:sp>
+      <p:pic>
+        <p:nvPicPr>
+          <p:cNvPr id="607234" name="Picture 2"/>
+          <p:cNvPicPr>
+            <a:picLocks noChangeAspect="1" noChangeArrowheads="1"/>
+          </p:cNvPicPr>
+          <p:nvPr/>
+        </p:nvPicPr>
+        <p:blipFill>
+          <a:blip r:embed="rId3">
+            <a:extLst>
+              <a:ext uri="{28A0092B-C50C-407E-A947-70E740481C1C}">
+                <a14:useLocalDpi xmlns:a14="http://schemas.microsoft.com/office/drawing/2010/main" val="0"/>
+              </a:ext>
+            </a:extLst>
+          </a:blip>
+          <a:srcRect/>
+          <a:stretch>
+            <a:fillRect/>
+          </a:stretch>
+        </p:blipFill>
+        <p:spPr bwMode="auto">
+          <a:xfrm>
+            <a:off x="4913015" y="1124744"/>
+            <a:ext cx="3724275" cy="2581275"/>
+          </a:xfrm>
+          <a:prstGeom prst="rect">
+            <a:avLst/>
+          </a:prstGeom>
+          <a:noFill/>
+          <a:ln>
+            <a:noFill/>
+          </a:ln>
+          <a:extLst>
+            <a:ext uri="{909E8E84-426E-40DD-AFC4-6F175D3DCCD1}">
+              <a14:hiddenFill xmlns:a14="http://schemas.microsoft.com/office/drawing/2010/main">
+                <a:solidFill>
+                  <a:schemeClr val="accent1"/>
+                </a:solidFill>
+              </a14:hiddenFill>
+            </a:ext>
+            <a:ext uri="{91240B29-F687-4F45-9708-019B960494DF}">
+              <a14:hiddenLine xmlns:a14="http://schemas.microsoft.com/office/drawing/2010/main" w="9525">
+                <a:solidFill>
+                  <a:schemeClr val="tx1"/>
+                </a:solidFill>
+                <a:miter lim="800000"/>
+                <a:headEnd/>
+                <a:tailEnd/>
+              </a14:hiddenLine>
+            </a:ext>
+          </a:extLst>
+        </p:spPr>
+      </p:pic>
+      <p:pic>
+        <p:nvPicPr>
+          <p:cNvPr id="607235" name="Picture 3"/>
+          <p:cNvPicPr>
+            <a:picLocks noChangeAspect="1" noChangeArrowheads="1"/>
+          </p:cNvPicPr>
+          <p:nvPr/>
+        </p:nvPicPr>
+        <p:blipFill>
+          <a:blip r:embed="rId4">
+            <a:extLst>
+              <a:ext uri="{28A0092B-C50C-407E-A947-70E740481C1C}">
+                <a14:useLocalDpi xmlns:a14="http://schemas.microsoft.com/office/drawing/2010/main" val="0"/>
+              </a:ext>
+            </a:extLst>
+          </a:blip>
+          <a:srcRect/>
+          <a:stretch>
+            <a:fillRect/>
+          </a:stretch>
+        </p:blipFill>
+        <p:spPr bwMode="auto">
+          <a:xfrm>
+            <a:off x="827584" y="3804506"/>
+            <a:ext cx="5505450" cy="2962275"/>
+          </a:xfrm>
+          <a:prstGeom prst="rect">
+            <a:avLst/>
+          </a:prstGeom>
+          <a:noFill/>
+          <a:ln>
+            <a:noFill/>
+          </a:ln>
+          <a:extLst>
+            <a:ext uri="{909E8E84-426E-40DD-AFC4-6F175D3DCCD1}">
+              <a14:hiddenFill xmlns:a14="http://schemas.microsoft.com/office/drawing/2010/main">
+                <a:solidFill>
+                  <a:schemeClr val="accent1"/>
+                </a:solidFill>
+              </a14:hiddenFill>
+            </a:ext>
+            <a:ext uri="{91240B29-F687-4F45-9708-019B960494DF}">
+              <a14:hiddenLine xmlns:a14="http://schemas.microsoft.com/office/drawing/2010/main" w="9525">
+                <a:solidFill>
+                  <a:schemeClr val="tx1"/>
+                </a:solidFill>
+                <a:miter lim="800000"/>
+                <a:headEnd/>
+                <a:tailEnd/>
+              </a14:hiddenLine>
+            </a:ext>
+          </a:extLst>
+        </p:spPr>
+      </p:pic>
+    </p:spTree>
+    <p:extLst>
+      <p:ext uri="{BB962C8B-B14F-4D97-AF65-F5344CB8AC3E}">
+        <p14:creationId xmlns:p14="http://schemas.microsoft.com/office/powerpoint/2010/main" val="286044298"/>
+      </p:ext>
+    </p:extLst>
+  </p:cSld>
+  <p:clrMapOvr>
+    <a:masterClrMapping/>
+  </p:clrMapOvr>
+  <p:timing>
+    <p:tnLst>
+      <p:par>
+        <p:cTn id="1" dur="indefinite" restart="never" nodeType="tmRoot"/>
+      </p:par>
+    </p:tnLst>
+  </p:timing>
+</p:sld>
+</file>
+
+<file path=ppt/slides/slide23.xml><?xml version="1.0" encoding="utf-8"?>
+<p:sld xmlns:a="http://schemas.openxmlformats.org/drawingml/2006/main" xmlns:r="http://schemas.openxmlformats.org/officeDocument/2006/relationships" xmlns:p="http://schemas.openxmlformats.org/presentationml/2006/main">
+  <p:cSld>
+    <p:spTree>
+      <p:nvGrpSpPr>
+        <p:cNvPr id="1" name=""/>
+        <p:cNvGrpSpPr/>
+        <p:nvPr/>
+      </p:nvGrpSpPr>
+      <p:grpSpPr>
+        <a:xfrm>
+          <a:off x="0" y="0"/>
+          <a:ext cx="0" cy="0"/>
+          <a:chOff x="0" y="0"/>
+          <a:chExt cx="0" cy="0"/>
+        </a:xfrm>
+      </p:grpSpPr>
+      <p:sp>
+        <p:nvSpPr>
           <p:cNvPr id="12" name="Slide Number Placeholder 4"/>
           <p:cNvSpPr>
             <a:spLocks noGrp="1"/>
@@ -13596,7 +14199,7 @@
             <a:fld id="{28FFA457-0E7A-4172-895E-216B6EE96EDE}" type="slidenum">
               <a:rPr lang="vi-VN"/>
               <a:pPr/>
-              <a:t>22</a:t>
+              <a:t>23</a:t>
             </a:fld>
             <a:endParaRPr lang="vi-VN"/>
           </a:p>
@@ -16966,140 +17569,6 @@
 </p:sld>
 </file>
 
-<file path=ppt/slides/slide23.xml><?xml version="1.0" encoding="utf-8"?>
-<p:sld xmlns:a="http://schemas.openxmlformats.org/drawingml/2006/main" xmlns:r="http://schemas.openxmlformats.org/officeDocument/2006/relationships" xmlns:p="http://schemas.openxmlformats.org/presentationml/2006/main">
-  <p:cSld>
-    <p:spTree>
-      <p:nvGrpSpPr>
-        <p:cNvPr id="1" name=""/>
-        <p:cNvGrpSpPr/>
-        <p:nvPr/>
-      </p:nvGrpSpPr>
-      <p:grpSpPr>
-        <a:xfrm>
-          <a:off x="0" y="0"/>
-          <a:ext cx="0" cy="0"/>
-          <a:chOff x="0" y="0"/>
-          <a:chExt cx="0" cy="0"/>
-        </a:xfrm>
-      </p:grpSpPr>
-      <p:sp>
-        <p:nvSpPr>
-          <p:cNvPr id="7" name="Slide Number Placeholder 5"/>
-          <p:cNvSpPr>
-            <a:spLocks noGrp="1"/>
-          </p:cNvSpPr>
-          <p:nvPr>
-            <p:ph type="sldNum" sz="quarter" idx="12"/>
-          </p:nvPr>
-        </p:nvSpPr>
-        <p:spPr/>
-        <p:txBody>
-          <a:bodyPr/>
-          <a:lstStyle/>
-          <a:p>
-            <a:fld id="{C3E2EB5A-72BA-4A6F-9BBE-4880C703D936}" type="slidenum">
-              <a:rPr lang="vi-VN"/>
-              <a:pPr/>
-              <a:t>23</a:t>
-            </a:fld>
-            <a:endParaRPr lang="vi-VN"/>
-          </a:p>
-        </p:txBody>
-      </p:sp>
-      <p:sp>
-        <p:nvSpPr>
-          <p:cNvPr id="584706" name="Rectangle 2"/>
-          <p:cNvSpPr>
-            <a:spLocks noGrp="1" noChangeArrowheads="1"/>
-          </p:cNvSpPr>
-          <p:nvPr>
-            <p:ph type="title"/>
-          </p:nvPr>
-        </p:nvSpPr>
-        <p:spPr/>
-        <p:txBody>
-          <a:bodyPr/>
-          <a:lstStyle/>
-          <a:p>
-            <a:r>
-              <a:rPr lang="vi-VN" dirty="0" smtClean="0"/>
-              <a:t>Đơn vị mã hóa tối ưu cho mã VB</a:t>
-            </a:r>
-            <a:endParaRPr lang="vi-VN" dirty="0"/>
-          </a:p>
-        </p:txBody>
-      </p:sp>
-      <p:sp>
-        <p:nvSpPr>
-          <p:cNvPr id="584707" name="Rectangle 3"/>
-          <p:cNvSpPr>
-            <a:spLocks noGrp="1" noChangeArrowheads="1"/>
-          </p:cNvSpPr>
-          <p:nvPr>
-            <p:ph type="body" idx="1"/>
-          </p:nvPr>
-        </p:nvSpPr>
-        <p:spPr>
-          <a:xfrm>
-            <a:off x="755576" y="2017985"/>
-            <a:ext cx="8064896" cy="4651375"/>
-          </a:xfrm>
-        </p:spPr>
-        <p:txBody>
-          <a:bodyPr/>
-          <a:lstStyle/>
-          <a:p>
-            <a:pPr algn="just">
-              <a:lnSpc>
-                <a:spcPct val="150000"/>
-              </a:lnSpc>
-            </a:pPr>
-            <a:r>
-              <a:rPr lang="vi-VN" sz="2400" dirty="0" smtClean="0"/>
-              <a:t>Nếu sử dụng đơn vị mã hóa lớn sẽ lãng phí bộ nhớ đối với các khoảng cách nhỏ, ngược lại nếu sử dụng đơn vị nhỏ sẽ lãng phí bộ nhớ đối với giá trị lớn.</a:t>
-            </a:r>
-          </a:p>
-          <a:p>
-            <a:pPr lvl="1" algn="just">
-              <a:lnSpc>
-                <a:spcPct val="150000"/>
-              </a:lnSpc>
-            </a:pPr>
-            <a:r>
-              <a:rPr lang="vi-VN" sz="2000" dirty="0" smtClean="0"/>
-              <a:t>Có thể sử dụng các đơn vị mã hóa khác: 32 bits, 16 bits, 4 bits tùy theo đặc điểm phân bố giá trị số;</a:t>
-            </a:r>
-          </a:p>
-          <a:p>
-            <a:pPr lvl="1" algn="just">
-              <a:lnSpc>
-                <a:spcPct val="150000"/>
-              </a:lnSpc>
-            </a:pPr>
-            <a:r>
-              <a:rPr lang="vi-VN" sz="2000" dirty="0" smtClean="0"/>
-              <a:t>Hoặc gom các giá trị nhỏ thành giá trị lớn hơn, v.v.</a:t>
-            </a:r>
-            <a:endParaRPr lang="vi-VN" sz="2000" dirty="0"/>
-          </a:p>
-        </p:txBody>
-      </p:sp>
-    </p:spTree>
-  </p:cSld>
-  <p:clrMapOvr>
-    <a:masterClrMapping/>
-  </p:clrMapOvr>
-  <p:timing>
-    <p:tnLst>
-      <p:par>
-        <p:cTn id="1" dur="indefinite" restart="never" nodeType="tmRoot"/>
-      </p:par>
-    </p:tnLst>
-  </p:timing>
-</p:sld>
-</file>
-
 <file path=ppt/slides/slide24.xml><?xml version="1.0" encoding="utf-8"?>
 <p:sld xmlns:a="http://schemas.openxmlformats.org/drawingml/2006/main" xmlns:r="http://schemas.openxmlformats.org/officeDocument/2006/relationships" xmlns:p="http://schemas.openxmlformats.org/presentationml/2006/main">
   <p:cSld>
@@ -17132,7 +17601,7 @@
           <a:bodyPr/>
           <a:lstStyle/>
           <a:p>
-            <a:fld id="{9FB4A984-8F77-40EE-89F6-DD8356174D85}" type="slidenum">
+            <a:fld id="{C3E2EB5A-72BA-4A6F-9BBE-4880C703D936}" type="slidenum">
               <a:rPr lang="vi-VN"/>
               <a:pPr/>
               <a:t>24</a:t>
@@ -17143,7 +17612,7 @@
       </p:sp>
       <p:sp>
         <p:nvSpPr>
-          <p:cNvPr id="585730" name="Rectangle 2"/>
+          <p:cNvPr id="584706" name="Rectangle 2"/>
           <p:cNvSpPr>
             <a:spLocks noGrp="1" noChangeArrowheads="1"/>
           </p:cNvSpPr>
@@ -17157,16 +17626,8 @@
           <a:lstStyle/>
           <a:p>
             <a:r>
-              <a:rPr lang="en-US" dirty="0" err="1" smtClean="0"/>
-              <a:t>Mã</a:t>
-            </a:r>
-            <a:r>
-              <a:rPr lang="en-US" dirty="0" smtClean="0"/>
-              <a:t> Unary </a:t>
-            </a:r>
-            <a:r>
-              <a:rPr lang="en-US" dirty="0"/>
-              <a:t>code</a:t>
+              <a:rPr lang="vi-VN" dirty="0" smtClean="0"/>
+              <a:t>Đơn vị mã hóa tối ưu cho mã VB</a:t>
             </a:r>
             <a:endParaRPr lang="vi-VN" dirty="0"/>
           </a:p>
@@ -17174,7 +17635,7 @@
       </p:sp>
       <p:sp>
         <p:nvSpPr>
-          <p:cNvPr id="585731" name="Rectangle 3"/>
+          <p:cNvPr id="584707" name="Rectangle 3"/>
           <p:cNvSpPr>
             <a:spLocks noGrp="1" noChangeArrowheads="1"/>
           </p:cNvSpPr>
@@ -17184,111 +17645,46 @@
         </p:nvSpPr>
         <p:spPr>
           <a:xfrm>
-            <a:off x="179388" y="2017713"/>
-            <a:ext cx="8775700" cy="3643535"/>
+            <a:off x="755576" y="2017985"/>
+            <a:ext cx="8064896" cy="4651375"/>
           </a:xfrm>
         </p:spPr>
         <p:txBody>
           <a:bodyPr/>
           <a:lstStyle/>
           <a:p>
-            <a:r>
-              <a:rPr lang="vi-VN" dirty="0" smtClean="0"/>
-              <a:t>Biểu diễn số </a:t>
-            </a:r>
-            <a:r>
-              <a:rPr lang="vi-VN" i="1" dirty="0" smtClean="0"/>
-              <a:t>n</a:t>
-            </a:r>
-            <a:r>
-              <a:rPr lang="vi-VN" dirty="0" smtClean="0"/>
-              <a:t> như chuỗi </a:t>
-            </a:r>
-            <a:r>
-              <a:rPr lang="vi-VN" i="1" dirty="0" smtClean="0"/>
-              <a:t>n</a:t>
-            </a:r>
-            <a:r>
-              <a:rPr lang="vi-VN" dirty="0" smtClean="0"/>
-              <a:t> số 1 thêm số 0 ở cuối.</a:t>
-            </a:r>
-          </a:p>
-          <a:p>
-            <a:r>
-              <a:rPr lang="vi-VN" dirty="0" smtClean="0"/>
-              <a:t>Unary code của 3 là 1110.</a:t>
-            </a:r>
-          </a:p>
-          <a:p>
-            <a:r>
-              <a:rPr lang="vi-VN" dirty="0" smtClean="0"/>
-              <a:t>Unary code của 40 là</a:t>
-            </a:r>
-          </a:p>
-          <a:p>
-            <a:pPr>
-              <a:buFont typeface="Wingdings" panose="05000000000000000000" pitchFamily="2" charset="2"/>
-              <a:buNone/>
+            <a:pPr algn="just">
+              <a:lnSpc>
+                <a:spcPct val="150000"/>
+              </a:lnSpc>
             </a:pPr>
             <a:r>
-              <a:rPr lang="vi-VN" dirty="0" smtClean="0"/>
-              <a:t>11111111111111111111111111111111111111110 .</a:t>
-            </a:r>
-          </a:p>
-          <a:p>
-            <a:r>
-              <a:rPr lang="vi-VN" dirty="0" smtClean="0"/>
-              <a:t>Unary code của 80 là:</a:t>
-            </a:r>
-          </a:p>
-          <a:p>
-            <a:pPr>
-              <a:buFont typeface="Wingdings" panose="05000000000000000000" pitchFamily="2" charset="2"/>
-              <a:buNone/>
+              <a:rPr lang="vi-VN" sz="2400" dirty="0" smtClean="0"/>
+              <a:t>Nếu sử dụng đơn vị mã hóa lớn sẽ lãng phí bộ nhớ đối với các khoảng cách nhỏ, ngược lại nếu sử dụng đơn vị nhỏ sẽ lãng phí bộ nhớ đối với giá trị lớn.</a:t>
+            </a:r>
+          </a:p>
+          <a:p>
+            <a:pPr lvl="1" algn="just">
+              <a:lnSpc>
+                <a:spcPct val="150000"/>
+              </a:lnSpc>
             </a:pPr>
             <a:r>
-              <a:rPr lang="vi-VN" dirty="0" smtClean="0"/>
-              <a:t>111111111111111111111111111111111111111111111111111111111111111111111111111111110</a:t>
-            </a:r>
-            <a:endParaRPr lang="vi-VN" dirty="0"/>
-          </a:p>
-        </p:txBody>
-      </p:sp>
-      <p:sp>
-        <p:nvSpPr>
-          <p:cNvPr id="2" name="TextBox 1"/>
-          <p:cNvSpPr txBox="1"/>
-          <p:nvPr/>
-        </p:nvSpPr>
-        <p:spPr>
-          <a:xfrm>
-            <a:off x="467544" y="5949280"/>
-            <a:ext cx="7632848" cy="461665"/>
-          </a:xfrm>
-          <a:prstGeom prst="rect">
-            <a:avLst/>
-          </a:prstGeom>
-          <a:noFill/>
-        </p:spPr>
-        <p:txBody>
-          <a:bodyPr wrap="square" rtlCol="0">
-            <a:spAutoFit/>
-          </a:bodyPr>
-          <a:lstStyle/>
-          <a:p>
-            <a:r>
-              <a:rPr lang="vi-VN" sz="2400" dirty="0" smtClean="0">
-                <a:solidFill>
-                  <a:schemeClr val="tx2"/>
-                </a:solidFill>
-              </a:rPr>
-              <a:t>Hiệu quả ứng dụng?</a:t>
-            </a:r>
-            <a:endParaRPr lang="vi-VN" sz="2400" dirty="0">
-              <a:solidFill>
-                <a:schemeClr val="tx2"/>
-              </a:solidFill>
-            </a:endParaRPr>
+              <a:rPr lang="vi-VN" sz="2000" dirty="0" smtClean="0"/>
+              <a:t>Có thể sử dụng các đơn vị mã hóa khác: 32 bits, 16 bits, 4 bits tùy theo đặc điểm phân bố giá trị số;</a:t>
+            </a:r>
+          </a:p>
+          <a:p>
+            <a:pPr lvl="1" algn="just">
+              <a:lnSpc>
+                <a:spcPct val="150000"/>
+              </a:lnSpc>
+            </a:pPr>
+            <a:r>
+              <a:rPr lang="vi-VN" sz="2000" dirty="0" smtClean="0"/>
+              <a:t>Hoặc gom các giá trị nhỏ thành giá trị lớn hơn, v.v.</a:t>
+            </a:r>
+            <a:endParaRPr lang="vi-VN" sz="2000" dirty="0"/>
           </a:p>
         </p:txBody>
       </p:sp>
@@ -17339,7 +17735,7 @@
           <a:bodyPr/>
           <a:lstStyle/>
           <a:p>
-            <a:fld id="{691F32B8-7313-4434-AF3A-EE8A0A4F4B4D}" type="slidenum">
+            <a:fld id="{9FB4A984-8F77-40EE-89F6-DD8356174D85}" type="slidenum">
               <a:rPr lang="vi-VN"/>
               <a:pPr/>
               <a:t>25</a:t>
@@ -17350,7 +17746,7 @@
       </p:sp>
       <p:sp>
         <p:nvSpPr>
-          <p:cNvPr id="586754" name="Rectangle 2"/>
+          <p:cNvPr id="585730" name="Rectangle 2"/>
           <p:cNvSpPr>
             <a:spLocks noGrp="1" noChangeArrowheads="1"/>
           </p:cNvSpPr>
@@ -17364,16 +17760,24 @@
           <a:lstStyle/>
           <a:p>
             <a:r>
-              <a:rPr lang="en-US"/>
-              <a:t>Mã Gamma</a:t>
-            </a:r>
-            <a:endParaRPr lang="vi-VN"/>
+              <a:rPr lang="en-US" dirty="0" err="1" smtClean="0"/>
+              <a:t>Mã</a:t>
+            </a:r>
+            <a:r>
+              <a:rPr lang="en-US" dirty="0" smtClean="0"/>
+              <a:t> Unary </a:t>
+            </a:r>
+            <a:r>
+              <a:rPr lang="en-US" dirty="0"/>
+              <a:t>code</a:t>
+            </a:r>
+            <a:endParaRPr lang="vi-VN" dirty="0"/>
           </a:p>
         </p:txBody>
       </p:sp>
       <p:sp>
         <p:nvSpPr>
-          <p:cNvPr id="586755" name="Rectangle 3"/>
+          <p:cNvPr id="585731" name="Rectangle 3"/>
           <p:cNvSpPr>
             <a:spLocks noGrp="1" noChangeArrowheads="1"/>
           </p:cNvSpPr>
@@ -17383,8 +17787,8 @@
         </p:nvSpPr>
         <p:spPr>
           <a:xfrm>
-            <a:off x="250825" y="2017713"/>
-            <a:ext cx="8704263" cy="4114800"/>
+            <a:off x="179388" y="2017713"/>
+            <a:ext cx="8775700" cy="3643535"/>
           </a:xfrm>
         </p:spPr>
         <p:txBody>
@@ -17393,97 +17797,101 @@
           <a:p>
             <a:r>
               <a:rPr lang="vi-VN" dirty="0" smtClean="0"/>
-              <a:t>Biểu diễn một khoảng cách G bằng </a:t>
+              <a:t>Biểu diễn số </a:t>
             </a:r>
             <a:r>
               <a:rPr lang="vi-VN" i="1" dirty="0" smtClean="0"/>
-              <a:t>offset </a:t>
+              <a:t>n</a:t>
             </a:r>
             <a:r>
               <a:rPr lang="vi-VN" dirty="0" smtClean="0"/>
-              <a:t>và </a:t>
+              <a:t> như chuỗi </a:t>
             </a:r>
             <a:r>
               <a:rPr lang="vi-VN" i="1" dirty="0" smtClean="0"/>
-              <a:t>length</a:t>
-            </a:r>
-          </a:p>
-          <a:p>
-            <a:r>
-              <a:rPr lang="vi-VN" i="1" dirty="0" smtClean="0"/>
-              <a:t>offset là </a:t>
+              <a:t>n</a:t>
             </a:r>
             <a:r>
               <a:rPr lang="vi-VN" dirty="0" smtClean="0"/>
-              <a:t>mã nhị phân của </a:t>
-            </a:r>
-            <a:r>
-              <a:rPr lang="vi-VN" i="1" dirty="0" smtClean="0"/>
-              <a:t>G</a:t>
-            </a:r>
+              <a:t> số 1 thêm số 0 ở cuối.</a:t>
+            </a:r>
+          </a:p>
+          <a:p>
             <a:r>
               <a:rPr lang="vi-VN" dirty="0" smtClean="0"/>
-              <a:t> loại bỏ bit đứng đầu</a:t>
-            </a:r>
-          </a:p>
-          <a:p>
-            <a:pPr lvl="1"/>
+              <a:t>Unary code của 3 là 1110.</a:t>
+            </a:r>
+          </a:p>
+          <a:p>
             <a:r>
               <a:rPr lang="vi-VN" dirty="0" smtClean="0"/>
-              <a:t>Ví dụ 13 = 1101</a:t>
-            </a:r>
-            <a:r>
-              <a:rPr lang="vi-VN" baseline="-25000" dirty="0" smtClean="0"/>
-              <a:t>2</a:t>
-            </a:r>
+              <a:t>Unary code của 40 là</a:t>
+            </a:r>
+          </a:p>
+          <a:p>
+            <a:pPr>
+              <a:buFont typeface="Wingdings" panose="05000000000000000000" pitchFamily="2" charset="2"/>
+              <a:buNone/>
+            </a:pPr>
             <a:r>
               <a:rPr lang="vi-VN" dirty="0" smtClean="0"/>
-              <a:t> ; offset(13) = 101</a:t>
+              <a:t>11111111111111111111111111111111111111110 .</a:t>
             </a:r>
           </a:p>
           <a:p>
             <a:r>
               <a:rPr lang="vi-VN" dirty="0" smtClean="0"/>
-              <a:t>length là Unary Code của độ dài của offset</a:t>
-            </a:r>
-          </a:p>
-          <a:p>
-            <a:pPr lvl="1"/>
+              <a:t>Unary code của 80 là:</a:t>
+            </a:r>
+          </a:p>
+          <a:p>
+            <a:pPr>
+              <a:buFont typeface="Wingdings" panose="05000000000000000000" pitchFamily="2" charset="2"/>
+              <a:buNone/>
+            </a:pPr>
             <a:r>
               <a:rPr lang="vi-VN" dirty="0" smtClean="0"/>
-              <a:t>Với 13: offset = 101, length = </a:t>
-            </a:r>
-            <a:r>
-              <a:rPr lang="vi-VN" sz="2800" dirty="0" smtClean="0"/>
-              <a:t>1110.</a:t>
-            </a:r>
-          </a:p>
-          <a:p>
-            <a:r>
-              <a:rPr lang="vi-VN" dirty="0" smtClean="0"/>
-              <a:t>Mã Gamma = </a:t>
-            </a:r>
-            <a:r>
-              <a:rPr lang="vi-VN" i="1" dirty="0" smtClean="0"/>
-              <a:t>length</a:t>
-            </a:r>
-            <a:r>
-              <a:rPr lang="vi-VN" dirty="0" smtClean="0"/>
-              <a:t> + </a:t>
-            </a:r>
-            <a:r>
-              <a:rPr lang="vi-VN" i="1" dirty="0" smtClean="0"/>
-              <a:t>offset</a:t>
-            </a:r>
-            <a:endParaRPr lang="vi-VN" dirty="0" smtClean="0"/>
-          </a:p>
-          <a:p>
-            <a:pPr lvl="1"/>
-            <a:r>
-              <a:rPr lang="vi-VN" dirty="0" smtClean="0"/>
-              <a:t>Mã Gamma của 13 là 1110101</a:t>
+              <a:t>111111111111111111111111111111111111111111111111111111111111111111111111111111110</a:t>
             </a:r>
             <a:endParaRPr lang="vi-VN" dirty="0"/>
+          </a:p>
+        </p:txBody>
+      </p:sp>
+      <p:sp>
+        <p:nvSpPr>
+          <p:cNvPr id="2" name="TextBox 1"/>
+          <p:cNvSpPr txBox="1"/>
+          <p:nvPr/>
+        </p:nvSpPr>
+        <p:spPr>
+          <a:xfrm>
+            <a:off x="467544" y="5949280"/>
+            <a:ext cx="7632848" cy="461665"/>
+          </a:xfrm>
+          <a:prstGeom prst="rect">
+            <a:avLst/>
+          </a:prstGeom>
+          <a:noFill/>
+        </p:spPr>
+        <p:txBody>
+          <a:bodyPr wrap="square" rtlCol="0">
+            <a:spAutoFit/>
+          </a:bodyPr>
+          <a:lstStyle/>
+          <a:p>
+            <a:r>
+              <a:rPr lang="vi-VN" sz="2400" dirty="0" smtClean="0">
+                <a:solidFill>
+                  <a:schemeClr val="tx2"/>
+                </a:solidFill>
+              </a:rPr>
+              <a:t>Hiệu quả ứng dụng?</a:t>
+            </a:r>
+            <a:endParaRPr lang="vi-VN" sz="2400" dirty="0">
+              <a:solidFill>
+                <a:schemeClr val="tx2"/>
+              </a:solidFill>
+            </a:endParaRPr>
           </a:p>
         </p:txBody>
       </p:sp>
@@ -17521,6 +17929,201 @@
       </p:grpSpPr>
       <p:sp>
         <p:nvSpPr>
+          <p:cNvPr id="7" name="Slide Number Placeholder 5"/>
+          <p:cNvSpPr>
+            <a:spLocks noGrp="1"/>
+          </p:cNvSpPr>
+          <p:nvPr>
+            <p:ph type="sldNum" sz="quarter" idx="12"/>
+          </p:nvPr>
+        </p:nvSpPr>
+        <p:spPr/>
+        <p:txBody>
+          <a:bodyPr/>
+          <a:lstStyle/>
+          <a:p>
+            <a:fld id="{691F32B8-7313-4434-AF3A-EE8A0A4F4B4D}" type="slidenum">
+              <a:rPr lang="vi-VN"/>
+              <a:pPr/>
+              <a:t>26</a:t>
+            </a:fld>
+            <a:endParaRPr lang="vi-VN"/>
+          </a:p>
+        </p:txBody>
+      </p:sp>
+      <p:sp>
+        <p:nvSpPr>
+          <p:cNvPr id="586754" name="Rectangle 2"/>
+          <p:cNvSpPr>
+            <a:spLocks noGrp="1" noChangeArrowheads="1"/>
+          </p:cNvSpPr>
+          <p:nvPr>
+            <p:ph type="title"/>
+          </p:nvPr>
+        </p:nvSpPr>
+        <p:spPr/>
+        <p:txBody>
+          <a:bodyPr/>
+          <a:lstStyle/>
+          <a:p>
+            <a:r>
+              <a:rPr lang="en-US"/>
+              <a:t>Mã Gamma</a:t>
+            </a:r>
+            <a:endParaRPr lang="vi-VN"/>
+          </a:p>
+        </p:txBody>
+      </p:sp>
+      <p:sp>
+        <p:nvSpPr>
+          <p:cNvPr id="586755" name="Rectangle 3"/>
+          <p:cNvSpPr>
+            <a:spLocks noGrp="1" noChangeArrowheads="1"/>
+          </p:cNvSpPr>
+          <p:nvPr>
+            <p:ph type="body" idx="1"/>
+          </p:nvPr>
+        </p:nvSpPr>
+        <p:spPr>
+          <a:xfrm>
+            <a:off x="250825" y="2017713"/>
+            <a:ext cx="8704263" cy="4114800"/>
+          </a:xfrm>
+        </p:spPr>
+        <p:txBody>
+          <a:bodyPr/>
+          <a:lstStyle/>
+          <a:p>
+            <a:r>
+              <a:rPr lang="vi-VN" dirty="0" smtClean="0"/>
+              <a:t>Biểu diễn một khoảng cách G bằng </a:t>
+            </a:r>
+            <a:r>
+              <a:rPr lang="vi-VN" i="1" dirty="0" smtClean="0"/>
+              <a:t>offset </a:t>
+            </a:r>
+            <a:r>
+              <a:rPr lang="vi-VN" dirty="0" smtClean="0"/>
+              <a:t>và </a:t>
+            </a:r>
+            <a:r>
+              <a:rPr lang="vi-VN" i="1" dirty="0" smtClean="0"/>
+              <a:t>length</a:t>
+            </a:r>
+          </a:p>
+          <a:p>
+            <a:r>
+              <a:rPr lang="vi-VN" i="1" dirty="0" smtClean="0"/>
+              <a:t>offset là </a:t>
+            </a:r>
+            <a:r>
+              <a:rPr lang="vi-VN" dirty="0" smtClean="0"/>
+              <a:t>mã nhị phân của </a:t>
+            </a:r>
+            <a:r>
+              <a:rPr lang="vi-VN" i="1" dirty="0" smtClean="0"/>
+              <a:t>G</a:t>
+            </a:r>
+            <a:r>
+              <a:rPr lang="vi-VN" dirty="0" smtClean="0"/>
+              <a:t> loại bỏ bit đứng đầu</a:t>
+            </a:r>
+          </a:p>
+          <a:p>
+            <a:pPr lvl="1"/>
+            <a:r>
+              <a:rPr lang="vi-VN" dirty="0" smtClean="0"/>
+              <a:t>Ví dụ 13 = 1101</a:t>
+            </a:r>
+            <a:r>
+              <a:rPr lang="vi-VN" baseline="-25000" dirty="0" smtClean="0"/>
+              <a:t>2</a:t>
+            </a:r>
+            <a:r>
+              <a:rPr lang="vi-VN" dirty="0" smtClean="0"/>
+              <a:t> ; offset(13) = 101</a:t>
+            </a:r>
+          </a:p>
+          <a:p>
+            <a:r>
+              <a:rPr lang="vi-VN" dirty="0" smtClean="0"/>
+              <a:t>length là Unary Code của độ dài của offset</a:t>
+            </a:r>
+          </a:p>
+          <a:p>
+            <a:pPr lvl="1"/>
+            <a:r>
+              <a:rPr lang="vi-VN" dirty="0" smtClean="0"/>
+              <a:t>Với 13: offset = 101, length = </a:t>
+            </a:r>
+            <a:r>
+              <a:rPr lang="vi-VN" sz="2800" dirty="0" smtClean="0"/>
+              <a:t>1110.</a:t>
+            </a:r>
+          </a:p>
+          <a:p>
+            <a:r>
+              <a:rPr lang="vi-VN" dirty="0" smtClean="0"/>
+              <a:t>Mã Gamma = </a:t>
+            </a:r>
+            <a:r>
+              <a:rPr lang="vi-VN" i="1" dirty="0" smtClean="0"/>
+              <a:t>length</a:t>
+            </a:r>
+            <a:r>
+              <a:rPr lang="vi-VN" dirty="0" smtClean="0"/>
+              <a:t> + </a:t>
+            </a:r>
+            <a:r>
+              <a:rPr lang="vi-VN" i="1" dirty="0" smtClean="0"/>
+              <a:t>offset</a:t>
+            </a:r>
+            <a:endParaRPr lang="vi-VN" dirty="0" smtClean="0"/>
+          </a:p>
+          <a:p>
+            <a:pPr lvl="1"/>
+            <a:r>
+              <a:rPr lang="vi-VN" dirty="0" smtClean="0"/>
+              <a:t>Mã Gamma của 13 là 1110101</a:t>
+            </a:r>
+            <a:endParaRPr lang="vi-VN" dirty="0"/>
+          </a:p>
+        </p:txBody>
+      </p:sp>
+    </p:spTree>
+  </p:cSld>
+  <p:clrMapOvr>
+    <a:masterClrMapping/>
+  </p:clrMapOvr>
+  <p:timing>
+    <p:tnLst>
+      <p:par>
+        <p:cTn id="1" dur="indefinite" restart="never" nodeType="tmRoot"/>
+      </p:par>
+    </p:tnLst>
+  </p:timing>
+</p:sld>
+</file>
+
+<file path=ppt/slides/slide27.xml><?xml version="1.0" encoding="utf-8"?>
+<p:sld xmlns:a="http://schemas.openxmlformats.org/drawingml/2006/main" xmlns:r="http://schemas.openxmlformats.org/officeDocument/2006/relationships" xmlns:p="http://schemas.openxmlformats.org/presentationml/2006/main">
+  <p:cSld>
+    <p:spTree>
+      <p:nvGrpSpPr>
+        <p:cNvPr id="1" name=""/>
+        <p:cNvGrpSpPr/>
+        <p:nvPr/>
+      </p:nvGrpSpPr>
+      <p:grpSpPr>
+        <a:xfrm>
+          <a:off x="0" y="0"/>
+          <a:ext cx="0" cy="0"/>
+          <a:chOff x="0" y="0"/>
+          <a:chExt cx="0" cy="0"/>
+        </a:xfrm>
+      </p:grpSpPr>
+      <p:sp>
+        <p:nvSpPr>
           <p:cNvPr id="7" name="Slide Number Placeholder 4"/>
           <p:cNvSpPr>
             <a:spLocks noGrp="1"/>
@@ -17537,7 +18140,7 @@
             <a:fld id="{1E3EAE01-EEE5-4E7C-9851-7B30A46AABFD}" type="slidenum">
               <a:rPr lang="vi-VN"/>
               <a:pPr/>
-              <a:t>26</a:t>
+              <a:t>27</a:t>
             </a:fld>
             <a:endParaRPr lang="vi-VN"/>
           </a:p>
@@ -27185,128 +27788,6 @@
 </p:sld>
 </file>
 
-<file path=ppt/slides/slide27.xml><?xml version="1.0" encoding="utf-8"?>
-<p:sld xmlns:a="http://schemas.openxmlformats.org/drawingml/2006/main" xmlns:r="http://schemas.openxmlformats.org/officeDocument/2006/relationships" xmlns:p="http://schemas.openxmlformats.org/presentationml/2006/main">
-  <p:cSld>
-    <p:spTree>
-      <p:nvGrpSpPr>
-        <p:cNvPr id="1" name=""/>
-        <p:cNvGrpSpPr/>
-        <p:nvPr/>
-      </p:nvGrpSpPr>
-      <p:grpSpPr>
-        <a:xfrm>
-          <a:off x="0" y="0"/>
-          <a:ext cx="0" cy="0"/>
-          <a:chOff x="0" y="0"/>
-          <a:chExt cx="0" cy="0"/>
-        </a:xfrm>
-      </p:grpSpPr>
-      <p:sp>
-        <p:nvSpPr>
-          <p:cNvPr id="7" name="Slide Number Placeholder 5"/>
-          <p:cNvSpPr>
-            <a:spLocks noGrp="1"/>
-          </p:cNvSpPr>
-          <p:nvPr>
-            <p:ph type="sldNum" sz="quarter" idx="12"/>
-          </p:nvPr>
-        </p:nvSpPr>
-        <p:spPr/>
-        <p:txBody>
-          <a:bodyPr/>
-          <a:lstStyle/>
-          <a:p>
-            <a:fld id="{8FC411E2-EBBF-48B2-AE62-1708E033CD7E}" type="slidenum">
-              <a:rPr lang="vi-VN"/>
-              <a:pPr/>
-              <a:t>27</a:t>
-            </a:fld>
-            <a:endParaRPr lang="vi-VN"/>
-          </a:p>
-        </p:txBody>
-      </p:sp>
-      <p:sp>
-        <p:nvSpPr>
-          <p:cNvPr id="589826" name="Rectangle 2"/>
-          <p:cNvSpPr>
-            <a:spLocks noGrp="1" noChangeArrowheads="1"/>
-          </p:cNvSpPr>
-          <p:nvPr>
-            <p:ph type="title"/>
-          </p:nvPr>
-        </p:nvSpPr>
-        <p:spPr/>
-        <p:txBody>
-          <a:bodyPr/>
-          <a:lstStyle/>
-          <a:p>
-            <a:r>
-              <a:rPr lang="vi-VN" dirty="0" smtClean="0"/>
-              <a:t>Mã Gamma vs. mã VB</a:t>
-            </a:r>
-            <a:endParaRPr lang="vi-VN" dirty="0"/>
-          </a:p>
-        </p:txBody>
-      </p:sp>
-      <p:sp>
-        <p:nvSpPr>
-          <p:cNvPr id="589827" name="Rectangle 3"/>
-          <p:cNvSpPr>
-            <a:spLocks noGrp="1" noChangeArrowheads="1"/>
-          </p:cNvSpPr>
-          <p:nvPr>
-            <p:ph type="body" idx="1"/>
-          </p:nvPr>
-        </p:nvSpPr>
-        <p:spPr>
-          <a:xfrm>
-            <a:off x="395288" y="2017713"/>
-            <a:ext cx="8559800" cy="4114800"/>
-          </a:xfrm>
-        </p:spPr>
-        <p:txBody>
-          <a:bodyPr/>
-          <a:lstStyle/>
-          <a:p>
-            <a:pPr algn="just"/>
-            <a:r>
-              <a:rPr lang="vi-VN" dirty="0" smtClean="0"/>
-              <a:t>Đều có thể giải mã cùng tiến trình đọc dữ liệu.</a:t>
-            </a:r>
-          </a:p>
-          <a:p>
-            <a:pPr algn="just"/>
-            <a:r>
-              <a:rPr lang="vi-VN" dirty="0" smtClean="0"/>
-              <a:t>Mã Gamma có tỉ lệ nén ổn định cho mọi giá trị mã văn bản và nén tốt hơn mã VB;</a:t>
-            </a:r>
-          </a:p>
-          <a:p>
-            <a:pPr algn="just"/>
-            <a:r>
-              <a:rPr lang="vi-VN" dirty="0" smtClean="0"/>
-              <a:t>Mã Gamma sử dụng các thao tác trên bits nên chậm hơn mã VB.</a:t>
-            </a:r>
-            <a:endParaRPr lang="vi-VN" dirty="0"/>
-          </a:p>
-        </p:txBody>
-      </p:sp>
-    </p:spTree>
-  </p:cSld>
-  <p:clrMapOvr>
-    <a:masterClrMapping/>
-  </p:clrMapOvr>
-  <p:timing>
-    <p:tnLst>
-      <p:par>
-        <p:cTn id="1" dur="indefinite" restart="never" nodeType="tmRoot"/>
-      </p:par>
-    </p:tnLst>
-  </p:timing>
-</p:sld>
-</file>
-
 <file path=ppt/slides/slide28.xml><?xml version="1.0" encoding="utf-8"?>
 <p:sld xmlns:a="http://schemas.openxmlformats.org/drawingml/2006/main" xmlns:r="http://schemas.openxmlformats.org/officeDocument/2006/relationships" xmlns:p="http://schemas.openxmlformats.org/presentationml/2006/main">
   <p:cSld>
@@ -27364,8 +27845,8 @@
           <a:lstStyle/>
           <a:p>
             <a:r>
-              <a:rPr lang="vi-VN" smtClean="0"/>
-              <a:t>Bài tập 11.1</a:t>
+              <a:rPr lang="vi-VN" dirty="0" smtClean="0"/>
+              <a:t>Mã Gamma vs. mã VB</a:t>
             </a:r>
             <a:endParaRPr lang="vi-VN" dirty="0"/>
           </a:p>
@@ -27391,82 +27872,30 @@
           <a:bodyPr/>
           <a:lstStyle/>
           <a:p>
-            <a:pPr marL="0" indent="0" algn="just">
-              <a:buNone/>
-            </a:pPr>
+            <a:pPr algn="just"/>
             <a:r>
               <a:rPr lang="vi-VN" dirty="0" smtClean="0"/>
-              <a:t>Cho danh sách mã văn bản sau:</a:t>
-            </a:r>
-          </a:p>
-          <a:p>
-            <a:pPr marL="0" indent="0" algn="ctr">
-              <a:buNone/>
-            </a:pPr>
+              <a:t>Đều có thể giải mã cùng tiến trình đọc dữ liệu.</a:t>
+            </a:r>
+          </a:p>
+          <a:p>
+            <a:pPr algn="just"/>
             <a:r>
               <a:rPr lang="vi-VN" dirty="0" smtClean="0"/>
-              <a:t>1, 3, 10, 120, 121</a:t>
-            </a:r>
-          </a:p>
-          <a:p>
-            <a:pPr marL="0" indent="0" algn="just">
-              <a:buNone/>
-            </a:pPr>
+              <a:t>Mã Gamma có tỉ lệ nén ổn định cho mọi giá trị mã văn bản và nén tốt hơn mã VB;</a:t>
+            </a:r>
+          </a:p>
+          <a:p>
+            <a:pPr algn="just"/>
             <a:r>
               <a:rPr lang="vi-VN" dirty="0" smtClean="0"/>
-              <a:t>a</a:t>
-            </a:r>
-            <a:r>
-              <a:rPr lang="vi-VN" smtClean="0"/>
-              <a:t>) Hãy </a:t>
-            </a:r>
-            <a:r>
-              <a:rPr lang="vi-VN" dirty="0" smtClean="0"/>
-              <a:t>xác định danh sách khoảng cách;</a:t>
-            </a:r>
-          </a:p>
-          <a:p>
-            <a:pPr marL="0" indent="0" algn="just">
-              <a:buNone/>
-            </a:pPr>
-            <a:r>
-              <a:rPr lang="vi-VN" dirty="0" smtClean="0"/>
-              <a:t>b</a:t>
-            </a:r>
-            <a:r>
-              <a:rPr lang="vi-VN" smtClean="0"/>
-              <a:t>) Hãy </a:t>
-            </a:r>
-            <a:r>
-              <a:rPr lang="vi-VN" dirty="0" smtClean="0"/>
-              <a:t>mã hóa kết quả mục a bằng mã VB, đơn vị mã hóa là 8 bits;</a:t>
-            </a:r>
-          </a:p>
-          <a:p>
-            <a:pPr marL="0" indent="0" algn="just">
-              <a:buNone/>
-            </a:pPr>
-            <a:r>
-              <a:rPr lang="vi-VN" dirty="0" smtClean="0"/>
-              <a:t>c</a:t>
-            </a:r>
-            <a:r>
-              <a:rPr lang="vi-VN" smtClean="0"/>
-              <a:t>) Hãy </a:t>
-            </a:r>
-            <a:r>
-              <a:rPr lang="vi-VN" dirty="0" smtClean="0"/>
-              <a:t>mã hóa kết quả mục a bằng mã Gamma.</a:t>
-            </a:r>
+              <a:t>Mã Gamma sử dụng các thao tác trên bits nên chậm hơn mã VB.</a:t>
+            </a:r>
+            <a:endParaRPr lang="vi-VN" dirty="0"/>
           </a:p>
         </p:txBody>
       </p:sp>
     </p:spTree>
-    <p:extLst>
-      <p:ext uri="{BB962C8B-B14F-4D97-AF65-F5344CB8AC3E}">
-        <p14:creationId xmlns:p14="http://schemas.microsoft.com/office/powerpoint/2010/main" val="983448740"/>
-      </p:ext>
-    </p:extLst>
   </p:cSld>
   <p:clrMapOvr>
     <a:masterClrMapping/>
@@ -27539,11 +27968,7 @@
           <a:p>
             <a:r>
               <a:rPr lang="vi-VN" smtClean="0"/>
-              <a:t>Bài </a:t>
-            </a:r>
-            <a:r>
-              <a:rPr lang="vi-VN" smtClean="0"/>
-              <a:t>tập 11.2</a:t>
+              <a:t>Bài tập 11.1</a:t>
             </a:r>
             <a:endParaRPr lang="vi-VN" dirty="0"/>
           </a:p>
@@ -27574,7 +27999,7 @@
             </a:pPr>
             <a:r>
               <a:rPr lang="vi-VN" dirty="0" smtClean="0"/>
-              <a:t>a) Dãy bits sau là mã VB của danh sách khoảng cách, đơn vị mã hóa là 4 bits (nibbles):</a:t>
+              <a:t>Cho danh sách mã văn bản sau:</a:t>
             </a:r>
           </a:p>
           <a:p>
@@ -27583,7 +28008,7 @@
             </a:pPr>
             <a:r>
               <a:rPr lang="vi-VN" dirty="0" smtClean="0"/>
-              <a:t>1010 0001 1011 0101 1000</a:t>
+              <a:t>1, 3, 10, 120, 121</a:t>
             </a:r>
           </a:p>
           <a:p>
@@ -27592,7 +28017,15 @@
             </a:pPr>
             <a:r>
               <a:rPr lang="vi-VN" dirty="0" smtClean="0"/>
-              <a:t>Hãy xác định danh sách mã văn bản ban đầu.</a:t>
+              <a:t>a</a:t>
+            </a:r>
+            <a:r>
+              <a:rPr lang="vi-VN" smtClean="0"/>
+              <a:t>) Hãy </a:t>
+            </a:r>
+            <a:r>
+              <a:rPr lang="vi-VN" dirty="0" smtClean="0"/>
+              <a:t>xác định danh sách khoảng cách;</a:t>
             </a:r>
           </a:p>
           <a:p>
@@ -27601,18 +28034,16 @@
             </a:pPr>
             <a:r>
               <a:rPr lang="vi-VN" dirty="0" smtClean="0"/>
-              <a:t>b) Dãy bits sau là mã Gamma của danh sách khoảng cách:</a:t>
-            </a:r>
-          </a:p>
-          <a:p>
-            <a:pPr marL="0" indent="0" algn="ctr">
-              <a:buNone/>
-            </a:pPr>
+              <a:t>b</a:t>
+            </a:r>
             <a:r>
               <a:rPr lang="vi-VN" smtClean="0"/>
-              <a:t>110011110000101</a:t>
-            </a:r>
-            <a:endParaRPr lang="vi-VN" dirty="0" smtClean="0"/>
+              <a:t>) Hãy </a:t>
+            </a:r>
+            <a:r>
+              <a:rPr lang="vi-VN" dirty="0" smtClean="0"/>
+              <a:t>mã hóa kết quả mục a bằng mã VB, đơn vị mã hóa là 8 bits;</a:t>
+            </a:r>
           </a:p>
           <a:p>
             <a:pPr marL="0" indent="0" algn="just">
@@ -27620,7 +28051,15 @@
             </a:pPr>
             <a:r>
               <a:rPr lang="vi-VN" dirty="0" smtClean="0"/>
-              <a:t>Hãy xác định danh sách mã văn bản ban đầu.</a:t>
+              <a:t>c</a:t>
+            </a:r>
+            <a:r>
+              <a:rPr lang="vi-VN" smtClean="0"/>
+              <a:t>) Hãy </a:t>
+            </a:r>
+            <a:r>
+              <a:rPr lang="vi-VN" dirty="0" smtClean="0"/>
+              <a:t>mã hóa kết quả mục a bằng mã Gamma.</a:t>
             </a:r>
           </a:p>
         </p:txBody>
@@ -27628,7 +28067,7 @@
     </p:spTree>
     <p:extLst>
       <p:ext uri="{BB962C8B-B14F-4D97-AF65-F5344CB8AC3E}">
-        <p14:creationId xmlns:p14="http://schemas.microsoft.com/office/powerpoint/2010/main" val="295341811"/>
+        <p14:creationId xmlns:p14="http://schemas.microsoft.com/office/powerpoint/2010/main" val="983448740"/>
       </p:ext>
     </p:extLst>
   </p:cSld>
@@ -27901,15 +28340,7 @@
           <a:p>
             <a:r>
               <a:rPr lang="vi-VN" smtClean="0"/>
-              <a:t>Bài </a:t>
-            </a:r>
-            <a:r>
-              <a:rPr lang="en-US" smtClean="0"/>
-              <a:t>tập 11.3</a:t>
-            </a:r>
-            <a:r>
-              <a:rPr lang="vi-VN" smtClean="0"/>
-              <a:t> </a:t>
+              <a:t>Bài tập 11.2</a:t>
             </a:r>
             <a:endParaRPr lang="vi-VN" dirty="0"/>
           </a:p>
@@ -27939,17 +28370,62 @@
               <a:buNone/>
             </a:pPr>
             <a:r>
+              <a:rPr lang="vi-VN" dirty="0" smtClean="0"/>
+              <a:t>a) Dãy bits sau là mã VB của danh sách khoảng cách, đơn vị mã hóa là 4 bits (nibbles):</a:t>
+            </a:r>
+          </a:p>
+          <a:p>
+            <a:pPr marL="0" indent="0" algn="ctr">
+              <a:buNone/>
+            </a:pPr>
+            <a:r>
+              <a:rPr lang="vi-VN" dirty="0" smtClean="0"/>
+              <a:t>1010 0001 1011 0101 1000</a:t>
+            </a:r>
+          </a:p>
+          <a:p>
+            <a:pPr marL="0" indent="0" algn="just">
+              <a:buNone/>
+            </a:pPr>
+            <a:r>
+              <a:rPr lang="vi-VN" dirty="0" smtClean="0"/>
+              <a:t>Hãy xác định danh sách mã văn bản ban đầu.</a:t>
+            </a:r>
+          </a:p>
+          <a:p>
+            <a:pPr marL="0" indent="0" algn="just">
+              <a:buNone/>
+            </a:pPr>
+            <a:r>
+              <a:rPr lang="vi-VN" dirty="0" smtClean="0"/>
+              <a:t>b) Dãy bits sau là mã Gamma của danh sách khoảng cách:</a:t>
+            </a:r>
+          </a:p>
+          <a:p>
+            <a:pPr marL="0" indent="0" algn="ctr">
+              <a:buNone/>
+            </a:pPr>
+            <a:r>
               <a:rPr lang="vi-VN" smtClean="0"/>
-              <a:t>Hãy chứng minh kích thước bộ từ vựng là hữu hạn trên cơ sở luật Zipf và vô hạn trên cơ sở luật Heap. Chúng ta có thể suy diễn luật Heap từ luật Zipf hay không?</a:t>
+              <a:t>110011110000101</a:t>
             </a:r>
             <a:endParaRPr lang="vi-VN" dirty="0" smtClean="0"/>
+          </a:p>
+          <a:p>
+            <a:pPr marL="0" indent="0" algn="just">
+              <a:buNone/>
+            </a:pPr>
+            <a:r>
+              <a:rPr lang="vi-VN" dirty="0" smtClean="0"/>
+              <a:t>Hãy xác định danh sách mã văn bản ban đầu.</a:t>
+            </a:r>
           </a:p>
         </p:txBody>
       </p:sp>
     </p:spTree>
     <p:extLst>
       <p:ext uri="{BB962C8B-B14F-4D97-AF65-F5344CB8AC3E}">
-        <p14:creationId xmlns:p14="http://schemas.microsoft.com/office/powerpoint/2010/main" val="682036401"/>
+        <p14:creationId xmlns:p14="http://schemas.microsoft.com/office/powerpoint/2010/main" val="295341811"/>
       </p:ext>
     </p:extLst>
   </p:cSld>
@@ -28027,8 +28503,12 @@
               <a:t>Bài </a:t>
             </a:r>
             <a:r>
+              <a:rPr lang="en-US" smtClean="0"/>
+              <a:t>tập 11.3</a:t>
+            </a:r>
+            <a:r>
               <a:rPr lang="vi-VN" smtClean="0"/>
-              <a:t>tập 11.4 </a:t>
+              <a:t> </a:t>
             </a:r>
             <a:endParaRPr lang="vi-VN" dirty="0"/>
           </a:p>
@@ -28059,16 +28539,7 @@
             </a:pPr>
             <a:r>
               <a:rPr lang="vi-VN" smtClean="0"/>
-              <a:t>Giả sử cho một bộ từ điển với 100 000 từ. Kích thước cố định cho một từ là 20 bytes, sử dụng 4 bytes để lưu tần suất văn bản, và 4 bytes để lưu con trỏ.</a:t>
-            </a:r>
-          </a:p>
-          <a:p>
-            <a:pPr marL="0" indent="0" algn="just">
-              <a:buNone/>
-            </a:pPr>
-            <a:r>
-              <a:rPr lang="vi-VN" smtClean="0"/>
-              <a:t>Hãy ước lượng kích thước từ điển nếu chia khối trong hay trường hợp, k = 8 và k = 16.</a:t>
+              <a:t>Hãy chứng minh kích thước bộ từ vựng là hữu hạn trên cơ sở luật Zipf và vô hạn trên cơ sở luật Heap. Chúng ta có thể suy diễn luật Heap từ luật Zipf hay không?</a:t>
             </a:r>
             <a:endParaRPr lang="vi-VN" dirty="0" smtClean="0"/>
           </a:p>
@@ -28077,7 +28548,7 @@
     </p:spTree>
     <p:extLst>
       <p:ext uri="{BB962C8B-B14F-4D97-AF65-F5344CB8AC3E}">
-        <p14:creationId xmlns:p14="http://schemas.microsoft.com/office/powerpoint/2010/main" val="2543689011"/>
+        <p14:creationId xmlns:p14="http://schemas.microsoft.com/office/powerpoint/2010/main" val="682036401"/>
       </p:ext>
     </p:extLst>
   </p:cSld>
@@ -28113,6 +28584,130 @@
       </p:grpSpPr>
       <p:sp>
         <p:nvSpPr>
+          <p:cNvPr id="7" name="Slide Number Placeholder 5"/>
+          <p:cNvSpPr>
+            <a:spLocks noGrp="1"/>
+          </p:cNvSpPr>
+          <p:nvPr>
+            <p:ph type="sldNum" sz="quarter" idx="12"/>
+          </p:nvPr>
+        </p:nvSpPr>
+        <p:spPr/>
+        <p:txBody>
+          <a:bodyPr/>
+          <a:lstStyle/>
+          <a:p>
+            <a:fld id="{8FC411E2-EBBF-48B2-AE62-1708E033CD7E}" type="slidenum">
+              <a:rPr lang="vi-VN"/>
+              <a:pPr/>
+              <a:t>32</a:t>
+            </a:fld>
+            <a:endParaRPr lang="vi-VN"/>
+          </a:p>
+        </p:txBody>
+      </p:sp>
+      <p:sp>
+        <p:nvSpPr>
+          <p:cNvPr id="589826" name="Rectangle 2"/>
+          <p:cNvSpPr>
+            <a:spLocks noGrp="1" noChangeArrowheads="1"/>
+          </p:cNvSpPr>
+          <p:nvPr>
+            <p:ph type="title"/>
+          </p:nvPr>
+        </p:nvSpPr>
+        <p:spPr/>
+        <p:txBody>
+          <a:bodyPr/>
+          <a:lstStyle/>
+          <a:p>
+            <a:r>
+              <a:rPr lang="vi-VN" smtClean="0"/>
+              <a:t>Bài tập 11.4 </a:t>
+            </a:r>
+            <a:endParaRPr lang="vi-VN" dirty="0"/>
+          </a:p>
+        </p:txBody>
+      </p:sp>
+      <p:sp>
+        <p:nvSpPr>
+          <p:cNvPr id="589827" name="Rectangle 3"/>
+          <p:cNvSpPr>
+            <a:spLocks noGrp="1" noChangeArrowheads="1"/>
+          </p:cNvSpPr>
+          <p:nvPr>
+            <p:ph type="body" idx="1"/>
+          </p:nvPr>
+        </p:nvSpPr>
+        <p:spPr>
+          <a:xfrm>
+            <a:off x="395288" y="2017713"/>
+            <a:ext cx="8559800" cy="4114800"/>
+          </a:xfrm>
+        </p:spPr>
+        <p:txBody>
+          <a:bodyPr/>
+          <a:lstStyle/>
+          <a:p>
+            <a:pPr marL="0" indent="0" algn="just">
+              <a:buNone/>
+            </a:pPr>
+            <a:r>
+              <a:rPr lang="vi-VN" smtClean="0"/>
+              <a:t>Giả sử cho một bộ từ điển với 100 000 từ. Kích thước cố định cho một từ là 20 bytes, sử dụng 4 bytes để lưu tần suất văn bản, và 4 bytes để lưu con trỏ.</a:t>
+            </a:r>
+          </a:p>
+          <a:p>
+            <a:pPr marL="0" indent="0" algn="just">
+              <a:buNone/>
+            </a:pPr>
+            <a:r>
+              <a:rPr lang="vi-VN" smtClean="0"/>
+              <a:t>Hãy ước lượng kích thước từ điển nếu chia khối trong hay trường hợp, k = 8 và k = 16.</a:t>
+            </a:r>
+            <a:endParaRPr lang="vi-VN" dirty="0" smtClean="0"/>
+          </a:p>
+        </p:txBody>
+      </p:sp>
+    </p:spTree>
+    <p:extLst>
+      <p:ext uri="{BB962C8B-B14F-4D97-AF65-F5344CB8AC3E}">
+        <p14:creationId xmlns:p14="http://schemas.microsoft.com/office/powerpoint/2010/main" val="2543689011"/>
+      </p:ext>
+    </p:extLst>
+  </p:cSld>
+  <p:clrMapOvr>
+    <a:masterClrMapping/>
+  </p:clrMapOvr>
+  <p:timing>
+    <p:tnLst>
+      <p:par>
+        <p:cTn id="1" dur="indefinite" restart="never" nodeType="tmRoot"/>
+      </p:par>
+    </p:tnLst>
+  </p:timing>
+</p:sld>
+</file>
+
+<file path=ppt/slides/slide33.xml><?xml version="1.0" encoding="utf-8"?>
+<p:sld xmlns:a="http://schemas.openxmlformats.org/drawingml/2006/main" xmlns:r="http://schemas.openxmlformats.org/officeDocument/2006/relationships" xmlns:p="http://schemas.openxmlformats.org/presentationml/2006/main">
+  <p:cSld>
+    <p:spTree>
+      <p:nvGrpSpPr>
+        <p:cNvPr id="1" name=""/>
+        <p:cNvGrpSpPr/>
+        <p:nvPr/>
+      </p:nvGrpSpPr>
+      <p:grpSpPr>
+        <a:xfrm>
+          <a:off x="0" y="0"/>
+          <a:ext cx="0" cy="0"/>
+          <a:chOff x="0" y="0"/>
+          <a:chExt cx="0" cy="0"/>
+        </a:xfrm>
+      </p:grpSpPr>
+      <p:sp>
+        <p:nvSpPr>
           <p:cNvPr id="7" name="Slide Number Placeholder 4"/>
           <p:cNvSpPr>
             <a:spLocks noGrp="1"/>
@@ -28129,7 +28724,7 @@
             <a:fld id="{7A34BF14-22AB-4CD6-8979-90420ED014C3}" type="slidenum">
               <a:rPr lang="vi-VN"/>
               <a:pPr/>
-              <a:t>32</a:t>
+              <a:t>33</a:t>
             </a:fld>
             <a:endParaRPr lang="vi-VN"/>
           </a:p>
@@ -28729,7 +29324,7 @@
           <a:graphicData uri="http://schemas.openxmlformats.org/presentationml/2006/ole">
             <mc:AlternateContent xmlns:mc="http://schemas.openxmlformats.org/markup-compatibility/2006">
               <mc:Choice xmlns:v="urn:schemas-microsoft-com:vml" Requires="v">
-                <p:oleObj spid="_x0000_s606975" name="Equation" r:id="rId3" imgW="799920" imgH="253800" progId="Equation.3">
+                <p:oleObj spid="_x0000_s606984" name="Equation" r:id="rId3" imgW="799920" imgH="253800" progId="Equation.3">
                   <p:embed/>
                 </p:oleObj>
               </mc:Choice>
@@ -28822,7 +29417,7 @@
           <a:graphicData uri="http://schemas.openxmlformats.org/presentationml/2006/ole">
             <mc:AlternateContent xmlns:mc="http://schemas.openxmlformats.org/markup-compatibility/2006">
               <mc:Choice xmlns:v="urn:schemas-microsoft-com:vml" Requires="v">
-                <p:oleObj spid="_x0000_s606976" name="Equation" r:id="rId5" imgW="939600" imgH="419040" progId="Equation.3">
+                <p:oleObj spid="_x0000_s606985" name="Equation" r:id="rId5" imgW="939600" imgH="419040" progId="Equation.3">
                   <p:embed/>
                 </p:oleObj>
               </mc:Choice>
@@ -28915,7 +29510,7 @@
           <a:graphicData uri="http://schemas.openxmlformats.org/presentationml/2006/ole">
             <mc:AlternateContent xmlns:mc="http://schemas.openxmlformats.org/markup-compatibility/2006">
               <mc:Choice xmlns:v="urn:schemas-microsoft-com:vml" Requires="v">
-                <p:oleObj spid="_x0000_s606977" name="Equation" r:id="rId7" imgW="1574640" imgH="533160" progId="Equation.3">
+                <p:oleObj spid="_x0000_s606986" name="Equation" r:id="rId7" imgW="1574640" imgH="533160" progId="Equation.3">
                   <p:embed/>
                 </p:oleObj>
               </mc:Choice>
@@ -30682,7 +31277,7 @@
   </a:extraClrSchemeLst>
   <a:extLst>
     <a:ext uri="{05A4C25C-085E-4340-85A3-A5531E510DB2}">
-      <thm15:themeFamily xmlns:thm15="http://schemas.microsoft.com/office/thememl/2012/main" xmlns="" name="Office Theme" id="{62F939B6-93AF-4DB8-9C6B-D6C7DFDC589F}" vid="{4A3C46E8-61CC-4603-A589-7422A47A8E4A}"/>
+      <thm15:themeFamily xmlns="" xmlns:thm15="http://schemas.microsoft.com/office/thememl/2012/main" name="Office Theme" id="{62F939B6-93AF-4DB8-9C6B-D6C7DFDC589F}" vid="{4A3C46E8-61CC-4603-A589-7422A47A8E4A}"/>
     </a:ext>
   </a:extLst>
 </a:theme>
@@ -30943,7 +31538,7 @@
   <a:extraClrSchemeLst/>
   <a:extLst>
     <a:ext uri="{05A4C25C-085E-4340-85A3-A5531E510DB2}">
-      <thm15:themeFamily xmlns:thm15="http://schemas.microsoft.com/office/thememl/2012/main" xmlns="" name="Office Theme" id="{62F939B6-93AF-4DB8-9C6B-D6C7DFDC589F}" vid="{4A3C46E8-61CC-4603-A589-7422A47A8E4A}"/>
+      <thm15:themeFamily xmlns="" xmlns:thm15="http://schemas.microsoft.com/office/thememl/2012/main" name="Office Theme" id="{62F939B6-93AF-4DB8-9C6B-D6C7DFDC589F}" vid="{4A3C46E8-61CC-4603-A589-7422A47A8E4A}"/>
     </a:ext>
   </a:extLst>
 </a:theme>

</xml_diff>

<commit_message>
BX bài tập bài 13
</commit_message>
<xml_diff>
--- a/Bai 11 Nén chi muc nguoc.pptx
+++ b/Bai 11 Nén chi muc nguoc.pptx
@@ -171,7 +171,7 @@
   </p:defaultTextStyle>
   <p:extLst>
     <p:ext uri="{EFAFB233-063F-42B5-8137-9DF3F51BA10A}">
-      <p15:sldGuideLst xmlns="" xmlns:p15="http://schemas.microsoft.com/office/powerpoint/2012/main">
+      <p15:sldGuideLst xmlns:p15="http://schemas.microsoft.com/office/powerpoint/2012/main" xmlns="">
         <p15:guide id="1" orient="horz" pos="2160">
           <p15:clr>
             <a:srgbClr val="A4A3A4"/>
@@ -7012,12 +7012,12 @@
           <a:graphicData uri="http://schemas.openxmlformats.org/presentationml/2006/ole">
             <mc:AlternateContent xmlns:mc="http://schemas.openxmlformats.org/markup-compatibility/2006">
               <mc:Choice xmlns:v="urn:schemas-microsoft-com:vml" Requires="v">
-                <p:oleObj spid="_x0000_s562481" name="Document" r:id="rId3" imgW="6562100" imgH="4119372" progId="Word.Document.8">
+                <p:oleObj spid="_x0000_s562482" name="Document" r:id="rId4" imgW="6562100" imgH="4119372" progId="Word.Document.8">
                   <p:embed/>
                 </p:oleObj>
               </mc:Choice>
               <mc:Fallback>
-                <p:oleObj name="Document" r:id="rId3" imgW="6562100" imgH="4119372" progId="Word.Document.8">
+                <p:oleObj name="Document" r:id="rId4" imgW="6562100" imgH="4119372" progId="Word.Document.8">
                   <p:embed/>
                   <p:pic>
                     <p:nvPicPr>
@@ -7028,7 +7028,7 @@
                       <p:nvPr/>
                     </p:nvPicPr>
                     <p:blipFill>
-                      <a:blip r:embed="rId4"/>
+                      <a:blip r:embed="rId5"/>
                       <a:srcRect/>
                       <a:stretch>
                         <a:fillRect/>
@@ -8787,7 +8787,7 @@
           <a:graphicData uri="http://schemas.openxmlformats.org/presentationml/2006/ole">
             <mc:AlternateContent xmlns:mc="http://schemas.openxmlformats.org/markup-compatibility/2006">
               <mc:Choice xmlns:v="urn:schemas-microsoft-com:vml" Requires="v">
-                <p:oleObj spid="_x0000_s564527" name="Документ" r:id="rId3" imgW="6404760" imgH="3941280" progId="Word.Document.8">
+                <p:oleObj spid="_x0000_s564528" name="Документ" r:id="rId3" imgW="6404760" imgH="3941280" progId="Word.Document.8">
                   <p:embed/>
                 </p:oleObj>
               </mc:Choice>
@@ -10190,7 +10190,7 @@
           <a:graphicData uri="http://schemas.openxmlformats.org/presentationml/2006/ole">
             <mc:AlternateContent xmlns:mc="http://schemas.openxmlformats.org/markup-compatibility/2006">
               <mc:Choice xmlns:v="urn:schemas-microsoft-com:vml" Requires="v">
-                <p:oleObj spid="_x0000_s566568" name="Document" r:id="rId3" imgW="6599520" imgH="4689000" progId="Word.Document.8">
+                <p:oleObj spid="_x0000_s566569" name="Document" r:id="rId3" imgW="6599520" imgH="4689000" progId="Word.Document.8">
                   <p:embed/>
                 </p:oleObj>
               </mc:Choice>
@@ -28663,7 +28663,15 @@
             </a:pPr>
             <a:r>
               <a:rPr lang="vi-VN" smtClean="0"/>
-              <a:t>Hãy ước lượng kích thước từ điển nếu chia khối trong hay trường hợp, k = 8 và k = 16.</a:t>
+              <a:t>Hãy ước lượng kích thước từ điển nếu chia khối trong </a:t>
+            </a:r>
+            <a:r>
+              <a:rPr lang="vi-VN" smtClean="0"/>
+              <a:t>hai </a:t>
+            </a:r>
+            <a:r>
+              <a:rPr lang="vi-VN" smtClean="0"/>
+              <a:t>trường hợp, k = 8 và k = 16.</a:t>
             </a:r>
             <a:endParaRPr lang="vi-VN" dirty="0" smtClean="0"/>
           </a:p>
@@ -29324,7 +29332,7 @@
           <a:graphicData uri="http://schemas.openxmlformats.org/presentationml/2006/ole">
             <mc:AlternateContent xmlns:mc="http://schemas.openxmlformats.org/markup-compatibility/2006">
               <mc:Choice xmlns:v="urn:schemas-microsoft-com:vml" Requires="v">
-                <p:oleObj spid="_x0000_s606984" name="Equation" r:id="rId3" imgW="799920" imgH="253800" progId="Equation.3">
+                <p:oleObj spid="_x0000_s606987" name="Equation" r:id="rId3" imgW="799920" imgH="253800" progId="Equation.3">
                   <p:embed/>
                 </p:oleObj>
               </mc:Choice>
@@ -29417,7 +29425,7 @@
           <a:graphicData uri="http://schemas.openxmlformats.org/presentationml/2006/ole">
             <mc:AlternateContent xmlns:mc="http://schemas.openxmlformats.org/markup-compatibility/2006">
               <mc:Choice xmlns:v="urn:schemas-microsoft-com:vml" Requires="v">
-                <p:oleObj spid="_x0000_s606985" name="Equation" r:id="rId5" imgW="939600" imgH="419040" progId="Equation.3">
+                <p:oleObj spid="_x0000_s606988" name="Equation" r:id="rId5" imgW="939600" imgH="419040" progId="Equation.3">
                   <p:embed/>
                 </p:oleObj>
               </mc:Choice>
@@ -29510,7 +29518,7 @@
           <a:graphicData uri="http://schemas.openxmlformats.org/presentationml/2006/ole">
             <mc:AlternateContent xmlns:mc="http://schemas.openxmlformats.org/markup-compatibility/2006">
               <mc:Choice xmlns:v="urn:schemas-microsoft-com:vml" Requires="v">
-                <p:oleObj spid="_x0000_s606986" name="Equation" r:id="rId7" imgW="1574640" imgH="533160" progId="Equation.3">
+                <p:oleObj spid="_x0000_s606989" name="Equation" r:id="rId7" imgW="1574640" imgH="533160" progId="Equation.3">
                   <p:embed/>
                 </p:oleObj>
               </mc:Choice>
@@ -31277,7 +31285,7 @@
   </a:extraClrSchemeLst>
   <a:extLst>
     <a:ext uri="{05A4C25C-085E-4340-85A3-A5531E510DB2}">
-      <thm15:themeFamily xmlns="" xmlns:thm15="http://schemas.microsoft.com/office/thememl/2012/main" name="Office Theme" id="{62F939B6-93AF-4DB8-9C6B-D6C7DFDC589F}" vid="{4A3C46E8-61CC-4603-A589-7422A47A8E4A}"/>
+      <thm15:themeFamily xmlns:thm15="http://schemas.microsoft.com/office/thememl/2012/main" xmlns="" name="Office Theme" id="{62F939B6-93AF-4DB8-9C6B-D6C7DFDC589F}" vid="{4A3C46E8-61CC-4603-A589-7422A47A8E4A}"/>
     </a:ext>
   </a:extLst>
 </a:theme>
@@ -31538,7 +31546,7 @@
   <a:extraClrSchemeLst/>
   <a:extLst>
     <a:ext uri="{05A4C25C-085E-4340-85A3-A5531E510DB2}">
-      <thm15:themeFamily xmlns="" xmlns:thm15="http://schemas.microsoft.com/office/thememl/2012/main" name="Office Theme" id="{62F939B6-93AF-4DB8-9C6B-D6C7DFDC589F}" vid="{4A3C46E8-61CC-4603-A589-7422A47A8E4A}"/>
+      <thm15:themeFamily xmlns:thm15="http://schemas.microsoft.com/office/thememl/2012/main" xmlns="" name="Office Theme" id="{62F939B6-93AF-4DB8-9C6B-D6C7DFDC589F}" vid="{4A3C46E8-61CC-4603-A589-7422A47A8E4A}"/>
     </a:ext>
   </a:extLst>
 </a:theme>

</xml_diff>

<commit_message>
Điều chỉnh bài 11
</commit_message>
<xml_diff>
--- a/Bai 11 Nén chi muc nguoc.pptx
+++ b/Bai 11 Nén chi muc nguoc.pptx
@@ -171,7 +171,7 @@
   </p:defaultTextStyle>
   <p:extLst>
     <p:ext uri="{EFAFB233-063F-42B5-8137-9DF3F51BA10A}">
-      <p15:sldGuideLst xmlns:p15="http://schemas.microsoft.com/office/powerpoint/2012/main" xmlns="">
+      <p15:sldGuideLst xmlns="" xmlns:p15="http://schemas.microsoft.com/office/powerpoint/2012/main">
         <p15:guide id="1" orient="horz" pos="2160">
           <p15:clr>
             <a:srgbClr val="A4A3A4"/>
@@ -6526,25 +6526,32 @@
           <a:p>
             <a:pPr algn="just"/>
             <a:r>
-              <a:rPr lang="vi-VN" smtClean="0"/>
-              <a:t>Bài 10. </a:t>
-            </a:r>
-            <a:r>
               <a:rPr lang="vi-VN" dirty="0" smtClean="0"/>
-              <a:t>Nén chỉ </a:t>
-            </a:r>
-            <a:r>
-              <a:rPr lang="vi-VN" smtClean="0"/>
-              <a:t>mục ngược</a:t>
+              <a:t>Bài </a:t>
+            </a:r>
+            <a:r>
+              <a:rPr lang="vi-VN" dirty="0" smtClean="0"/>
+              <a:t>1</a:t>
+            </a:r>
+            <a:r>
+              <a:rPr lang="en-US" dirty="0" smtClean="0"/>
+              <a:t>1</a:t>
+            </a:r>
+            <a:r>
+              <a:rPr lang="vi-VN" dirty="0" smtClean="0"/>
+              <a:t>. </a:t>
+            </a:r>
+            <a:r>
+              <a:rPr lang="vi-VN" dirty="0" smtClean="0"/>
+              <a:t>Nén chỉ mục ngược</a:t>
             </a:r>
           </a:p>
           <a:p>
             <a:pPr algn="just"/>
             <a:r>
-              <a:rPr lang="vi-VN" smtClean="0"/>
+              <a:rPr lang="vi-VN" dirty="0" smtClean="0"/>
               <a:t>IIR.C5. Index Compression</a:t>
             </a:r>
-            <a:endParaRPr lang="vi-VN" dirty="0" smtClean="0"/>
           </a:p>
           <a:p>
             <a:pPr algn="r"/>
@@ -6974,8 +6981,8 @@
         </p:nvSpPr>
         <p:spPr>
           <a:xfrm>
-            <a:off x="468313" y="2017713"/>
-            <a:ext cx="8486775" cy="1050925"/>
+            <a:off x="599256" y="2017713"/>
+            <a:ext cx="8355832" cy="1050925"/>
           </a:xfrm>
         </p:spPr>
         <p:txBody>
@@ -7012,12 +7019,12 @@
           <a:graphicData uri="http://schemas.openxmlformats.org/presentationml/2006/ole">
             <mc:AlternateContent xmlns:mc="http://schemas.openxmlformats.org/markup-compatibility/2006">
               <mc:Choice xmlns:v="urn:schemas-microsoft-com:vml" Requires="v">
-                <p:oleObj spid="_x0000_s562482" name="Document" r:id="rId4" imgW="6562100" imgH="4119372" progId="Word.Document.8">
+                <p:oleObj spid="_x0000_s562485" name="Document" r:id="rId3" imgW="6562100" imgH="4119372" progId="Word.Document.8">
                   <p:embed/>
                 </p:oleObj>
               </mc:Choice>
               <mc:Fallback>
-                <p:oleObj name="Document" r:id="rId4" imgW="6562100" imgH="4119372" progId="Word.Document.8">
+                <p:oleObj name="Document" r:id="rId3" imgW="6562100" imgH="4119372" progId="Word.Document.8">
                   <p:embed/>
                   <p:pic>
                     <p:nvPicPr>
@@ -7028,7 +7035,7 @@
                       <p:nvPr/>
                     </p:nvPicPr>
                     <p:blipFill>
-                      <a:blip r:embed="rId5"/>
+                      <a:blip r:embed="rId4"/>
                       <a:srcRect/>
                       <a:stretch>
                         <a:fillRect/>
@@ -8787,7 +8794,7 @@
           <a:graphicData uri="http://schemas.openxmlformats.org/presentationml/2006/ole">
             <mc:AlternateContent xmlns:mc="http://schemas.openxmlformats.org/markup-compatibility/2006">
               <mc:Choice xmlns:v="urn:schemas-microsoft-com:vml" Requires="v">
-                <p:oleObj spid="_x0000_s564528" name="Документ" r:id="rId3" imgW="6404760" imgH="3941280" progId="Word.Document.8">
+                <p:oleObj spid="_x0000_s564531" name="Документ" r:id="rId3" imgW="6404760" imgH="3941280" progId="Word.Document.8">
                   <p:embed/>
                 </p:oleObj>
               </mc:Choice>
@@ -9880,8 +9887,8 @@
         </p:nvSpPr>
         <p:spPr>
           <a:xfrm>
-            <a:off x="1042988" y="1730375"/>
-            <a:ext cx="7912100" cy="1482725"/>
+            <a:off x="611560" y="1946399"/>
+            <a:ext cx="8271520" cy="1338585"/>
           </a:xfrm>
         </p:spPr>
         <p:txBody>
@@ -9889,39 +9896,39 @@
           <a:lstStyle/>
           <a:p>
             <a:r>
-              <a:rPr lang="vi-VN" dirty="0" smtClean="0"/>
+              <a:rPr lang="vi-VN" sz="2400" dirty="0" smtClean="0"/>
               <a:t>Lưu con trỏ tới từ đầu tiên trong khối </a:t>
             </a:r>
             <a:r>
-              <a:rPr lang="vi-VN" i="1" dirty="0" smtClean="0"/>
+              <a:rPr lang="vi-VN" sz="2400" i="1" dirty="0" smtClean="0"/>
               <a:t>k</a:t>
             </a:r>
             <a:r>
-              <a:rPr lang="vi-VN" dirty="0" smtClean="0"/>
+              <a:rPr lang="vi-VN" sz="2400" dirty="0" smtClean="0"/>
               <a:t> từ.</a:t>
             </a:r>
           </a:p>
           <a:p>
             <a:pPr lvl="1"/>
             <a:r>
-              <a:rPr lang="vi-VN" dirty="0" smtClean="0"/>
+              <a:rPr lang="vi-VN" sz="2000" dirty="0" smtClean="0"/>
               <a:t>Như ví dụ: </a:t>
             </a:r>
             <a:r>
-              <a:rPr lang="vi-VN" i="1" dirty="0" smtClean="0"/>
+              <a:rPr lang="vi-VN" sz="2000" i="1" dirty="0" smtClean="0"/>
               <a:t>k=</a:t>
             </a:r>
             <a:r>
-              <a:rPr lang="vi-VN" dirty="0" smtClean="0"/>
+              <a:rPr lang="vi-VN" sz="2000" dirty="0" smtClean="0"/>
               <a:t>4.</a:t>
             </a:r>
           </a:p>
           <a:p>
             <a:r>
-              <a:rPr lang="vi-VN" dirty="0" smtClean="0"/>
+              <a:rPr lang="vi-VN" sz="2400" dirty="0" smtClean="0"/>
               <a:t>Bổ xung 1 byte để lưu độ dài từ</a:t>
             </a:r>
-            <a:endParaRPr lang="vi-VN" dirty="0"/>
+            <a:endParaRPr lang="vi-VN" sz="2400" dirty="0"/>
           </a:p>
         </p:txBody>
       </p:sp>
@@ -10190,7 +10197,7 @@
           <a:graphicData uri="http://schemas.openxmlformats.org/presentationml/2006/ole">
             <mc:AlternateContent xmlns:mc="http://schemas.openxmlformats.org/markup-compatibility/2006">
               <mc:Choice xmlns:v="urn:schemas-microsoft-com:vml" Requires="v">
-                <p:oleObj spid="_x0000_s566569" name="Document" r:id="rId3" imgW="6599520" imgH="4689000" progId="Word.Document.8">
+                <p:oleObj spid="_x0000_s566572" name="Document" r:id="rId3" imgW="6599520" imgH="4689000" progId="Word.Document.8">
                   <p:embed/>
                 </p:oleObj>
               </mc:Choice>
@@ -10935,8 +10942,8 @@
         </p:nvSpPr>
         <p:spPr>
           <a:xfrm>
-            <a:off x="539750" y="2017713"/>
-            <a:ext cx="8415338" cy="4114800"/>
+            <a:off x="611560" y="2017713"/>
+            <a:ext cx="8343528" cy="4114800"/>
           </a:xfrm>
         </p:spPr>
         <p:txBody>
@@ -11401,7 +11408,7 @@
         </p:nvSpPr>
         <p:spPr>
           <a:xfrm>
-            <a:off x="323528" y="2924944"/>
+            <a:off x="395536" y="2924944"/>
             <a:ext cx="4176464" cy="2808312"/>
           </a:xfrm>
         </p:spPr>
@@ -11676,8 +11683,8 @@
         </p:nvSpPr>
         <p:spPr>
           <a:xfrm>
-            <a:off x="404688" y="2081213"/>
-            <a:ext cx="8559800" cy="2274887"/>
+            <a:off x="539552" y="2081213"/>
+            <a:ext cx="8424936" cy="2274887"/>
           </a:xfrm>
         </p:spPr>
         <p:txBody>
@@ -12508,8 +12515,8 @@
         </p:nvSpPr>
         <p:spPr>
           <a:xfrm>
-            <a:off x="457200" y="2060575"/>
-            <a:ext cx="8229600" cy="2743200"/>
+            <a:off x="611560" y="2060575"/>
+            <a:ext cx="8075240" cy="2743200"/>
           </a:xfrm>
         </p:spPr>
         <p:txBody>
@@ -12947,8 +12954,8 @@
         </p:nvSpPr>
         <p:spPr>
           <a:xfrm>
-            <a:off x="323850" y="2017713"/>
-            <a:ext cx="8631238" cy="4651375"/>
+            <a:off x="611560" y="2017713"/>
+            <a:ext cx="8343528" cy="4651375"/>
           </a:xfrm>
         </p:spPr>
         <p:txBody>
@@ -13089,8 +13096,8 @@
         </p:nvSpPr>
         <p:spPr>
           <a:xfrm>
-            <a:off x="457200" y="2060575"/>
-            <a:ext cx="8229600" cy="2743200"/>
+            <a:off x="611560" y="2060575"/>
+            <a:ext cx="8075240" cy="2743200"/>
           </a:xfrm>
         </p:spPr>
         <p:txBody>
@@ -13863,8 +13870,8 @@
         </p:nvSpPr>
         <p:spPr>
           <a:xfrm>
-            <a:off x="323850" y="2017712"/>
-            <a:ext cx="8631238" cy="4579639"/>
+            <a:off x="611560" y="2017712"/>
+            <a:ext cx="8343528" cy="4579639"/>
           </a:xfrm>
         </p:spPr>
         <p:txBody>
@@ -17645,8 +17652,8 @@
         </p:nvSpPr>
         <p:spPr>
           <a:xfrm>
-            <a:off x="755576" y="2017985"/>
-            <a:ext cx="8064896" cy="4651375"/>
+            <a:off x="611560" y="2017985"/>
+            <a:ext cx="8208912" cy="4651375"/>
           </a:xfrm>
         </p:spPr>
         <p:txBody>
@@ -17787,8 +17794,8 @@
         </p:nvSpPr>
         <p:spPr>
           <a:xfrm>
-            <a:off x="179388" y="2017713"/>
-            <a:ext cx="8775700" cy="3643535"/>
+            <a:off x="611560" y="2017713"/>
+            <a:ext cx="8343528" cy="3643535"/>
           </a:xfrm>
         </p:spPr>
         <p:txBody>
@@ -17796,35 +17803,35 @@
           <a:lstStyle/>
           <a:p>
             <a:r>
-              <a:rPr lang="vi-VN" dirty="0" smtClean="0"/>
+              <a:rPr lang="vi-VN" sz="2400" dirty="0" smtClean="0"/>
               <a:t>Biểu diễn số </a:t>
             </a:r>
             <a:r>
-              <a:rPr lang="vi-VN" i="1" dirty="0" smtClean="0"/>
+              <a:rPr lang="vi-VN" sz="2400" i="1" dirty="0" smtClean="0"/>
               <a:t>n</a:t>
             </a:r>
             <a:r>
-              <a:rPr lang="vi-VN" dirty="0" smtClean="0"/>
+              <a:rPr lang="vi-VN" sz="2400" dirty="0" smtClean="0"/>
               <a:t> như chuỗi </a:t>
             </a:r>
             <a:r>
-              <a:rPr lang="vi-VN" i="1" dirty="0" smtClean="0"/>
+              <a:rPr lang="vi-VN" sz="2400" i="1" dirty="0" smtClean="0"/>
               <a:t>n</a:t>
             </a:r>
             <a:r>
-              <a:rPr lang="vi-VN" dirty="0" smtClean="0"/>
+              <a:rPr lang="vi-VN" sz="2400" dirty="0" smtClean="0"/>
               <a:t> số 1 thêm số 0 ở cuối.</a:t>
             </a:r>
           </a:p>
           <a:p>
             <a:r>
-              <a:rPr lang="vi-VN" dirty="0" smtClean="0"/>
+              <a:rPr lang="vi-VN" sz="2400" dirty="0" smtClean="0"/>
               <a:t>Unary code của 3 là 1110.</a:t>
             </a:r>
           </a:p>
           <a:p>
             <a:r>
-              <a:rPr lang="vi-VN" dirty="0" smtClean="0"/>
+              <a:rPr lang="vi-VN" sz="2400" dirty="0" smtClean="0"/>
               <a:t>Unary code của 40 là</a:t>
             </a:r>
           </a:p>
@@ -17834,13 +17841,13 @@
               <a:buNone/>
             </a:pPr>
             <a:r>
-              <a:rPr lang="vi-VN" dirty="0" smtClean="0"/>
+              <a:rPr lang="vi-VN" sz="2400" dirty="0" smtClean="0"/>
               <a:t>11111111111111111111111111111111111111110 .</a:t>
             </a:r>
           </a:p>
           <a:p>
             <a:r>
-              <a:rPr lang="vi-VN" dirty="0" smtClean="0"/>
+              <a:rPr lang="vi-VN" sz="2400" dirty="0" smtClean="0"/>
               <a:t>Unary code của 80 là:</a:t>
             </a:r>
           </a:p>
@@ -17850,10 +17857,10 @@
               <a:buNone/>
             </a:pPr>
             <a:r>
-              <a:rPr lang="vi-VN" dirty="0" smtClean="0"/>
+              <a:rPr lang="vi-VN" sz="2400" dirty="0" smtClean="0"/>
               <a:t>111111111111111111111111111111111111111111111111111111111111111111111111111111110</a:t>
             </a:r>
-            <a:endParaRPr lang="vi-VN" dirty="0"/>
+            <a:endParaRPr lang="vi-VN" sz="2400" dirty="0"/>
           </a:p>
         </p:txBody>
       </p:sp>
@@ -17986,8 +17993,8 @@
         </p:nvSpPr>
         <p:spPr>
           <a:xfrm>
-            <a:off x="250825" y="2017713"/>
-            <a:ext cx="8704263" cy="4114800"/>
+            <a:off x="611560" y="2017713"/>
+            <a:ext cx="8343528" cy="4114800"/>
           </a:xfrm>
         </p:spPr>
         <p:txBody>
@@ -17995,98 +18002,98 @@
           <a:lstStyle/>
           <a:p>
             <a:r>
+              <a:rPr lang="vi-VN" sz="2400" dirty="0" smtClean="0"/>
+              <a:t>Biểu diễn một khoảng cách G bằng </a:t>
+            </a:r>
+            <a:r>
+              <a:rPr lang="vi-VN" sz="2400" i="1" dirty="0" smtClean="0"/>
+              <a:t>offset </a:t>
+            </a:r>
+            <a:r>
+              <a:rPr lang="vi-VN" sz="2400" dirty="0" smtClean="0"/>
+              <a:t>và </a:t>
+            </a:r>
+            <a:r>
+              <a:rPr lang="vi-VN" sz="2400" i="1" dirty="0" smtClean="0"/>
+              <a:t>length</a:t>
+            </a:r>
+          </a:p>
+          <a:p>
+            <a:r>
+              <a:rPr lang="vi-VN" sz="2400" i="1" dirty="0" smtClean="0"/>
+              <a:t>offset là </a:t>
+            </a:r>
+            <a:r>
+              <a:rPr lang="vi-VN" sz="2400" dirty="0" smtClean="0"/>
+              <a:t>mã nhị phân của </a:t>
+            </a:r>
+            <a:r>
+              <a:rPr lang="vi-VN" sz="2400" i="1" dirty="0" smtClean="0"/>
+              <a:t>G</a:t>
+            </a:r>
+            <a:r>
+              <a:rPr lang="vi-VN" sz="2400" dirty="0" smtClean="0"/>
+              <a:t> loại bỏ bit đứng đầu</a:t>
+            </a:r>
+          </a:p>
+          <a:p>
+            <a:pPr lvl="1"/>
+            <a:r>
+              <a:rPr lang="vi-VN" sz="2000" dirty="0" smtClean="0"/>
+              <a:t>Ví dụ 13 = 1101</a:t>
+            </a:r>
+            <a:r>
+              <a:rPr lang="vi-VN" sz="2000" baseline="-25000" dirty="0" smtClean="0"/>
+              <a:t>2</a:t>
+            </a:r>
+            <a:r>
+              <a:rPr lang="vi-VN" sz="2000" dirty="0" smtClean="0"/>
+              <a:t> ; offset(13) = 101</a:t>
+            </a:r>
+          </a:p>
+          <a:p>
+            <a:r>
+              <a:rPr lang="vi-VN" sz="2400" dirty="0" smtClean="0"/>
+              <a:t>length là Unary Code của độ dài của offset</a:t>
+            </a:r>
+          </a:p>
+          <a:p>
+            <a:pPr lvl="1"/>
+            <a:r>
+              <a:rPr lang="vi-VN" sz="2000" dirty="0" smtClean="0"/>
+              <a:t>Với 13: offset = 101, length = </a:t>
+            </a:r>
+            <a:r>
               <a:rPr lang="vi-VN" dirty="0" smtClean="0"/>
-              <a:t>Biểu diễn một khoảng cách G bằng </a:t>
-            </a:r>
-            <a:r>
-              <a:rPr lang="vi-VN" i="1" dirty="0" smtClean="0"/>
-              <a:t>offset </a:t>
-            </a:r>
-            <a:r>
-              <a:rPr lang="vi-VN" dirty="0" smtClean="0"/>
-              <a:t>và </a:t>
-            </a:r>
-            <a:r>
-              <a:rPr lang="vi-VN" i="1" dirty="0" smtClean="0"/>
+              <a:t>1110.</a:t>
+            </a:r>
+          </a:p>
+          <a:p>
+            <a:r>
+              <a:rPr lang="vi-VN" sz="2400" dirty="0" smtClean="0"/>
+              <a:t>Mã Gamma = </a:t>
+            </a:r>
+            <a:r>
+              <a:rPr lang="vi-VN" sz="2400" i="1" dirty="0" smtClean="0"/>
               <a:t>length</a:t>
             </a:r>
-          </a:p>
-          <a:p>
-            <a:r>
-              <a:rPr lang="vi-VN" i="1" dirty="0" smtClean="0"/>
-              <a:t>offset là </a:t>
-            </a:r>
-            <a:r>
-              <a:rPr lang="vi-VN" dirty="0" smtClean="0"/>
-              <a:t>mã nhị phân của </a:t>
-            </a:r>
-            <a:r>
-              <a:rPr lang="vi-VN" i="1" dirty="0" smtClean="0"/>
-              <a:t>G</a:t>
-            </a:r>
-            <a:r>
-              <a:rPr lang="vi-VN" dirty="0" smtClean="0"/>
-              <a:t> loại bỏ bit đứng đầu</a:t>
-            </a:r>
+            <a:r>
+              <a:rPr lang="vi-VN" sz="2400" dirty="0" smtClean="0"/>
+              <a:t> + </a:t>
+            </a:r>
+            <a:r>
+              <a:rPr lang="vi-VN" sz="2400" i="1" dirty="0" smtClean="0"/>
+              <a:t>offset</a:t>
+            </a:r>
+            <a:endParaRPr lang="vi-VN" sz="2400" dirty="0" smtClean="0"/>
           </a:p>
           <a:p>
             <a:pPr lvl="1"/>
             <a:r>
-              <a:rPr lang="vi-VN" dirty="0" smtClean="0"/>
-              <a:t>Ví dụ 13 = 1101</a:t>
-            </a:r>
-            <a:r>
-              <a:rPr lang="vi-VN" baseline="-25000" dirty="0" smtClean="0"/>
-              <a:t>2</a:t>
-            </a:r>
-            <a:r>
-              <a:rPr lang="vi-VN" dirty="0" smtClean="0"/>
-              <a:t> ; offset(13) = 101</a:t>
-            </a:r>
-          </a:p>
-          <a:p>
-            <a:r>
-              <a:rPr lang="vi-VN" dirty="0" smtClean="0"/>
-              <a:t>length là Unary Code của độ dài của offset</a:t>
-            </a:r>
-          </a:p>
-          <a:p>
-            <a:pPr lvl="1"/>
-            <a:r>
-              <a:rPr lang="vi-VN" dirty="0" smtClean="0"/>
-              <a:t>Với 13: offset = 101, length = </a:t>
-            </a:r>
-            <a:r>
-              <a:rPr lang="vi-VN" sz="2800" dirty="0" smtClean="0"/>
-              <a:t>1110.</a:t>
-            </a:r>
-          </a:p>
-          <a:p>
-            <a:r>
-              <a:rPr lang="vi-VN" dirty="0" smtClean="0"/>
-              <a:t>Mã Gamma = </a:t>
-            </a:r>
-            <a:r>
-              <a:rPr lang="vi-VN" i="1" dirty="0" smtClean="0"/>
-              <a:t>length</a:t>
-            </a:r>
-            <a:r>
-              <a:rPr lang="vi-VN" dirty="0" smtClean="0"/>
-              <a:t> + </a:t>
-            </a:r>
-            <a:r>
-              <a:rPr lang="vi-VN" i="1" dirty="0" smtClean="0"/>
-              <a:t>offset</a:t>
-            </a:r>
-            <a:endParaRPr lang="vi-VN" dirty="0" smtClean="0"/>
-          </a:p>
-          <a:p>
-            <a:pPr lvl="1"/>
-            <a:r>
-              <a:rPr lang="vi-VN" dirty="0" smtClean="0"/>
+              <a:rPr lang="vi-VN" sz="2000" dirty="0" smtClean="0"/>
               <a:t>Mã Gamma của 13 là 1110101</a:t>
             </a:r>
-            <a:endParaRPr lang="vi-VN" dirty="0"/>
+            <a:endParaRPr lang="vi-VN" sz="2000" dirty="0"/>
           </a:p>
         </p:txBody>
       </p:sp>
@@ -27864,8 +27871,8 @@
         </p:nvSpPr>
         <p:spPr>
           <a:xfrm>
-            <a:off x="395288" y="2017713"/>
-            <a:ext cx="8559800" cy="4114800"/>
+            <a:off x="611560" y="2017713"/>
+            <a:ext cx="8343528" cy="4114800"/>
           </a:xfrm>
         </p:spPr>
         <p:txBody>
@@ -27874,24 +27881,24 @@
           <a:p>
             <a:pPr algn="just"/>
             <a:r>
-              <a:rPr lang="vi-VN" dirty="0" smtClean="0"/>
+              <a:rPr lang="vi-VN" sz="2400" dirty="0" smtClean="0"/>
               <a:t>Đều có thể giải mã cùng tiến trình đọc dữ liệu.</a:t>
             </a:r>
           </a:p>
           <a:p>
             <a:pPr algn="just"/>
             <a:r>
-              <a:rPr lang="vi-VN" dirty="0" smtClean="0"/>
+              <a:rPr lang="vi-VN" sz="2400" dirty="0" smtClean="0"/>
               <a:t>Mã Gamma có tỉ lệ nén ổn định cho mọi giá trị mã văn bản và nén tốt hơn mã VB;</a:t>
             </a:r>
           </a:p>
           <a:p>
             <a:pPr algn="just"/>
             <a:r>
-              <a:rPr lang="vi-VN" dirty="0" smtClean="0"/>
+              <a:rPr lang="vi-VN" sz="2400" dirty="0" smtClean="0"/>
               <a:t>Mã Gamma sử dụng các thao tác trên bits nên chậm hơn mã VB.</a:t>
             </a:r>
-            <a:endParaRPr lang="vi-VN" dirty="0"/>
+            <a:endParaRPr lang="vi-VN" sz="2400" dirty="0"/>
           </a:p>
         </p:txBody>
       </p:sp>
@@ -27986,8 +27993,8 @@
         </p:nvSpPr>
         <p:spPr>
           <a:xfrm>
-            <a:off x="395288" y="2017713"/>
-            <a:ext cx="8559800" cy="4114800"/>
+            <a:off x="611560" y="2017713"/>
+            <a:ext cx="8343528" cy="4114800"/>
           </a:xfrm>
         </p:spPr>
         <p:txBody>
@@ -28017,15 +28024,7 @@
             </a:pPr>
             <a:r>
               <a:rPr lang="vi-VN" dirty="0" smtClean="0"/>
-              <a:t>a</a:t>
-            </a:r>
-            <a:r>
-              <a:rPr lang="vi-VN" smtClean="0"/>
-              <a:t>) Hãy </a:t>
-            </a:r>
-            <a:r>
-              <a:rPr lang="vi-VN" dirty="0" smtClean="0"/>
-              <a:t>xác định danh sách khoảng cách;</a:t>
+              <a:t>a) Hãy xác định danh sách khoảng cách;</a:t>
             </a:r>
           </a:p>
           <a:p>
@@ -28034,15 +28033,7 @@
             </a:pPr>
             <a:r>
               <a:rPr lang="vi-VN" dirty="0" smtClean="0"/>
-              <a:t>b</a:t>
-            </a:r>
-            <a:r>
-              <a:rPr lang="vi-VN" smtClean="0"/>
-              <a:t>) Hãy </a:t>
-            </a:r>
-            <a:r>
-              <a:rPr lang="vi-VN" dirty="0" smtClean="0"/>
-              <a:t>mã hóa kết quả mục a bằng mã VB, đơn vị mã hóa là 8 bits;</a:t>
+              <a:t>b) Hãy mã hóa kết quả mục a bằng mã VB, đơn vị mã hóa là 8 bits;</a:t>
             </a:r>
           </a:p>
           <a:p>
@@ -28051,15 +28042,7 @@
             </a:pPr>
             <a:r>
               <a:rPr lang="vi-VN" dirty="0" smtClean="0"/>
-              <a:t>c</a:t>
-            </a:r>
-            <a:r>
-              <a:rPr lang="vi-VN" smtClean="0"/>
-              <a:t>) Hãy </a:t>
-            </a:r>
-            <a:r>
-              <a:rPr lang="vi-VN" dirty="0" smtClean="0"/>
-              <a:t>mã hóa kết quả mục a bằng mã Gamma.</a:t>
+              <a:t>c) Hãy mã hóa kết quả mục a bằng mã Gamma.</a:t>
             </a:r>
           </a:p>
         </p:txBody>
@@ -28160,8 +28143,8 @@
         </p:nvSpPr>
         <p:spPr>
           <a:xfrm>
-            <a:off x="395288" y="2017713"/>
-            <a:ext cx="8559800" cy="2923455"/>
+            <a:off x="611560" y="2017713"/>
+            <a:ext cx="8343528" cy="2923455"/>
           </a:xfrm>
         </p:spPr>
         <p:txBody>
@@ -28358,8 +28341,8 @@
         </p:nvSpPr>
         <p:spPr>
           <a:xfrm>
-            <a:off x="395288" y="2017713"/>
-            <a:ext cx="8559800" cy="4114800"/>
+            <a:off x="611560" y="2017713"/>
+            <a:ext cx="8343528" cy="4114800"/>
           </a:xfrm>
         </p:spPr>
         <p:txBody>
@@ -28406,10 +28389,9 @@
               <a:buNone/>
             </a:pPr>
             <a:r>
-              <a:rPr lang="vi-VN" smtClean="0"/>
+              <a:rPr lang="vi-VN" dirty="0" smtClean="0"/>
               <a:t>110011110000101</a:t>
             </a:r>
-            <a:endParaRPr lang="vi-VN" dirty="0" smtClean="0"/>
           </a:p>
           <a:p>
             <a:pPr marL="0" indent="0" algn="just">
@@ -28526,8 +28508,8 @@
         </p:nvSpPr>
         <p:spPr>
           <a:xfrm>
-            <a:off x="395288" y="2017713"/>
-            <a:ext cx="8559800" cy="4114800"/>
+            <a:off x="611560" y="2017713"/>
+            <a:ext cx="8343528" cy="4114800"/>
           </a:xfrm>
         </p:spPr>
         <p:txBody>
@@ -28538,10 +28520,9 @@
               <a:buNone/>
             </a:pPr>
             <a:r>
-              <a:rPr lang="vi-VN" smtClean="0"/>
+              <a:rPr lang="vi-VN" dirty="0" smtClean="0"/>
               <a:t>Hãy chứng minh kích thước bộ từ vựng là hữu hạn trên cơ sở luật Zipf và vô hạn trên cơ sở luật Heap. Chúng ta có thể suy diễn luật Heap từ luật Zipf hay không?</a:t>
             </a:r>
-            <a:endParaRPr lang="vi-VN" dirty="0" smtClean="0"/>
           </a:p>
         </p:txBody>
       </p:sp>
@@ -28641,8 +28622,8 @@
         </p:nvSpPr>
         <p:spPr>
           <a:xfrm>
-            <a:off x="395288" y="2017713"/>
-            <a:ext cx="8559800" cy="4114800"/>
+            <a:off x="611560" y="2017713"/>
+            <a:ext cx="8343528" cy="4114800"/>
           </a:xfrm>
         </p:spPr>
         <p:txBody>
@@ -28653,7 +28634,7 @@
               <a:buNone/>
             </a:pPr>
             <a:r>
-              <a:rPr lang="vi-VN" smtClean="0"/>
+              <a:rPr lang="vi-VN" dirty="0" smtClean="0"/>
               <a:t>Giả sử cho một bộ từ điển với 100 000 từ. Kích thước cố định cho một từ là 20 bytes, sử dụng 4 bytes để lưu tần suất văn bản, và 4 bytes để lưu con trỏ.</a:t>
             </a:r>
           </a:p>
@@ -28662,18 +28643,9 @@
               <a:buNone/>
             </a:pPr>
             <a:r>
-              <a:rPr lang="vi-VN" smtClean="0"/>
-              <a:t>Hãy ước lượng kích thước từ điển nếu chia khối trong </a:t>
-            </a:r>
-            <a:r>
-              <a:rPr lang="vi-VN" smtClean="0"/>
-              <a:t>hai </a:t>
-            </a:r>
-            <a:r>
-              <a:rPr lang="vi-VN" smtClean="0"/>
-              <a:t>trường hợp, k = 8 và k = 16.</a:t>
-            </a:r>
-            <a:endParaRPr lang="vi-VN" dirty="0" smtClean="0"/>
+              <a:rPr lang="vi-VN" dirty="0" smtClean="0"/>
+              <a:t>Hãy ước lượng kích thước từ điển nếu chia khối trong hai trường hợp, k = 8 và k = 16.</a:t>
+            </a:r>
           </a:p>
         </p:txBody>
       </p:sp>
@@ -29332,7 +29304,7 @@
           <a:graphicData uri="http://schemas.openxmlformats.org/presentationml/2006/ole">
             <mc:AlternateContent xmlns:mc="http://schemas.openxmlformats.org/markup-compatibility/2006">
               <mc:Choice xmlns:v="urn:schemas-microsoft-com:vml" Requires="v">
-                <p:oleObj spid="_x0000_s606987" name="Equation" r:id="rId3" imgW="799920" imgH="253800" progId="Equation.3">
+                <p:oleObj spid="_x0000_s606996" name="Equation" r:id="rId3" imgW="799920" imgH="253800" progId="Equation.3">
                   <p:embed/>
                 </p:oleObj>
               </mc:Choice>
@@ -29425,7 +29397,7 @@
           <a:graphicData uri="http://schemas.openxmlformats.org/presentationml/2006/ole">
             <mc:AlternateContent xmlns:mc="http://schemas.openxmlformats.org/markup-compatibility/2006">
               <mc:Choice xmlns:v="urn:schemas-microsoft-com:vml" Requires="v">
-                <p:oleObj spid="_x0000_s606988" name="Equation" r:id="rId5" imgW="939600" imgH="419040" progId="Equation.3">
+                <p:oleObj spid="_x0000_s606997" name="Equation" r:id="rId5" imgW="939600" imgH="419040" progId="Equation.3">
                   <p:embed/>
                 </p:oleObj>
               </mc:Choice>
@@ -29518,7 +29490,7 @@
           <a:graphicData uri="http://schemas.openxmlformats.org/presentationml/2006/ole">
             <mc:AlternateContent xmlns:mc="http://schemas.openxmlformats.org/markup-compatibility/2006">
               <mc:Choice xmlns:v="urn:schemas-microsoft-com:vml" Requires="v">
-                <p:oleObj spid="_x0000_s606989" name="Equation" r:id="rId7" imgW="1574640" imgH="533160" progId="Equation.3">
+                <p:oleObj spid="_x0000_s606998" name="Equation" r:id="rId7" imgW="1574640" imgH="533160" progId="Equation.3">
                   <p:embed/>
                 </p:oleObj>
               </mc:Choice>
@@ -29784,8 +29756,8 @@
         </p:nvSpPr>
         <p:spPr>
           <a:xfrm>
-            <a:off x="755576" y="2061716"/>
-            <a:ext cx="8128074" cy="2303388"/>
+            <a:off x="611560" y="2061716"/>
+            <a:ext cx="8272090" cy="2303388"/>
           </a:xfrm>
           <a:solidFill>
             <a:schemeClr val="bg1"/>
@@ -30174,8 +30146,8 @@
         </p:nvSpPr>
         <p:spPr>
           <a:xfrm>
-            <a:off x="457200" y="2060575"/>
-            <a:ext cx="8229600" cy="2743200"/>
+            <a:off x="611560" y="2060575"/>
+            <a:ext cx="8075240" cy="2743200"/>
           </a:xfrm>
         </p:spPr>
         <p:txBody>
@@ -30474,8 +30446,8 @@
         </p:nvSpPr>
         <p:spPr>
           <a:xfrm>
-            <a:off x="323850" y="1989138"/>
-            <a:ext cx="8631238" cy="4114800"/>
+            <a:off x="611560" y="1989138"/>
+            <a:ext cx="8343528" cy="4114800"/>
           </a:xfrm>
         </p:spPr>
         <p:txBody>
@@ -31285,7 +31257,7 @@
   </a:extraClrSchemeLst>
   <a:extLst>
     <a:ext uri="{05A4C25C-085E-4340-85A3-A5531E510DB2}">
-      <thm15:themeFamily xmlns:thm15="http://schemas.microsoft.com/office/thememl/2012/main" xmlns="" name="Office Theme" id="{62F939B6-93AF-4DB8-9C6B-D6C7DFDC589F}" vid="{4A3C46E8-61CC-4603-A589-7422A47A8E4A}"/>
+      <thm15:themeFamily xmlns="" xmlns:thm15="http://schemas.microsoft.com/office/thememl/2012/main" name="Office Theme" id="{62F939B6-93AF-4DB8-9C6B-D6C7DFDC589F}" vid="{4A3C46E8-61CC-4603-A589-7422A47A8E4A}"/>
     </a:ext>
   </a:extLst>
 </a:theme>
@@ -31334,7 +31306,7 @@
     </a:clrScheme>
     <a:fontScheme name="Office">
       <a:majorFont>
-        <a:latin typeface="Calibri Light" panose="020F0302020204030204"/>
+        <a:latin typeface="Calibri Light"/>
         <a:ea typeface=""/>
         <a:cs typeface=""/>
         <a:font script="Jpan" typeface="ＭＳ Ｐゴシック"/>
@@ -31369,7 +31341,7 @@
         <a:font script="Geor" typeface="Sylfaen"/>
       </a:majorFont>
       <a:minorFont>
-        <a:latin typeface="Calibri" panose="020F0502020204030204"/>
+        <a:latin typeface="Calibri"/>
         <a:ea typeface=""/>
         <a:cs typeface=""/>
         <a:font script="Jpan" typeface="ＭＳ Ｐゴシック"/>
@@ -31546,7 +31518,7 @@
   <a:extraClrSchemeLst/>
   <a:extLst>
     <a:ext uri="{05A4C25C-085E-4340-85A3-A5531E510DB2}">
-      <thm15:themeFamily xmlns:thm15="http://schemas.microsoft.com/office/thememl/2012/main" xmlns="" name="Office Theme" id="{62F939B6-93AF-4DB8-9C6B-D6C7DFDC589F}" vid="{4A3C46E8-61CC-4603-A589-7422A47A8E4A}"/>
+      <thm15:themeFamily xmlns="" xmlns:thm15="http://schemas.microsoft.com/office/thememl/2012/main" name="Office Theme" id="{62F939B6-93AF-4DB8-9C6B-D6C7DFDC589F}" vid="{4A3C46E8-61CC-4603-A589-7422A47A8E4A}"/>
     </a:ext>
   </a:extLst>
 </a:theme>

</xml_diff>